<commit_message>
Added github pages and pull request slides
</commit_message>
<xml_diff>
--- a/github/GitHub_introduction.pptx
+++ b/github/GitHub_introduction.pptx
@@ -5,25 +5,26 @@
     <p:sldMasterId id="2147483762" r:id="rId1"/>
   </p:sldMasterIdLst>
   <p:notesMasterIdLst>
-    <p:notesMasterId r:id="rId18"/>
+    <p:notesMasterId r:id="rId19"/>
   </p:notesMasterIdLst>
   <p:sldIdLst>
     <p:sldId id="256" r:id="rId2"/>
     <p:sldId id="271" r:id="rId3"/>
-    <p:sldId id="269" r:id="rId4"/>
-    <p:sldId id="257" r:id="rId5"/>
-    <p:sldId id="273" r:id="rId6"/>
-    <p:sldId id="261" r:id="rId7"/>
-    <p:sldId id="267" r:id="rId8"/>
-    <p:sldId id="275" r:id="rId9"/>
-    <p:sldId id="264" r:id="rId10"/>
-    <p:sldId id="263" r:id="rId11"/>
-    <p:sldId id="266" r:id="rId12"/>
-    <p:sldId id="268" r:id="rId13"/>
-    <p:sldId id="274" r:id="rId14"/>
-    <p:sldId id="265" r:id="rId15"/>
+    <p:sldId id="278" r:id="rId4"/>
+    <p:sldId id="269" r:id="rId5"/>
+    <p:sldId id="257" r:id="rId6"/>
+    <p:sldId id="274" r:id="rId7"/>
+    <p:sldId id="273" r:id="rId8"/>
+    <p:sldId id="261" r:id="rId9"/>
+    <p:sldId id="267" r:id="rId10"/>
+    <p:sldId id="275" r:id="rId11"/>
+    <p:sldId id="264" r:id="rId12"/>
+    <p:sldId id="263" r:id="rId13"/>
+    <p:sldId id="266" r:id="rId14"/>
+    <p:sldId id="268" r:id="rId15"/>
     <p:sldId id="272" r:id="rId16"/>
-    <p:sldId id="270" r:id="rId17"/>
+    <p:sldId id="276" r:id="rId17"/>
+    <p:sldId id="270" r:id="rId18"/>
   </p:sldIdLst>
   <p:sldSz cx="12192000" cy="6858000"/>
   <p:notesSz cx="6858000" cy="9144000"/>
@@ -133,9 +134,455 @@
 <file path=ppt/revisionInfo.xml><?xml version="1.0" encoding="utf-8"?>
 <p1510:revInfo xmlns:a="http://schemas.openxmlformats.org/drawingml/2006/main" xmlns:r="http://schemas.openxmlformats.org/officeDocument/2006/relationships" xmlns:p1510="http://schemas.microsoft.com/office/powerpoint/2015/10/main">
   <p1510:revLst>
-    <p1510:client id="{933B2ABB-589C-474F-BD9E-2F06A09448A8}" v="28" dt="2024-12-06T17:23:30.856"/>
+    <p1510:client id="{E82048AB-D5A0-4234-8747-CCB7F93DD359}" v="11" dt="2025-02-06T21:27:14.983"/>
   </p1510:revLst>
 </p1510:revInfo>
+</file>
+
+<file path=ppt/changesInfos/changesInfo1.xml><?xml version="1.0" encoding="utf-8"?>
+<pc:chgInfo xmlns:a="http://schemas.openxmlformats.org/drawingml/2006/main" xmlns:r="http://schemas.openxmlformats.org/officeDocument/2006/relationships" xmlns:ac="http://schemas.microsoft.com/office/drawing/2013/main/command" xmlns:pc="http://schemas.microsoft.com/office/powerpoint/2013/main/command">
+  <pc:docChgLst>
+    <pc:chgData name="Pien, Catarina L" userId="055f424c-5a88-4e6e-9e88-d4462ff2eeee" providerId="ADAL" clId="{E82048AB-D5A0-4234-8747-CCB7F93DD359}"/>
+    <pc:docChg chg="undo redo custSel addSld delSld modSld sldOrd">
+      <pc:chgData name="Pien, Catarina L" userId="055f424c-5a88-4e6e-9e88-d4462ff2eeee" providerId="ADAL" clId="{E82048AB-D5A0-4234-8747-CCB7F93DD359}" dt="2025-02-06T21:34:26.342" v="4178" actId="20577"/>
+      <pc:docMkLst>
+        <pc:docMk/>
+      </pc:docMkLst>
+      <pc:sldChg chg="addSp modSp mod ord">
+        <pc:chgData name="Pien, Catarina L" userId="055f424c-5a88-4e6e-9e88-d4462ff2eeee" providerId="ADAL" clId="{E82048AB-D5A0-4234-8747-CCB7F93DD359}" dt="2025-02-06T21:32:21.574" v="4126" actId="20577"/>
+        <pc:sldMkLst>
+          <pc:docMk/>
+          <pc:sldMk cId="2745742810" sldId="257"/>
+        </pc:sldMkLst>
+        <pc:spChg chg="mod">
+          <ac:chgData name="Pien, Catarina L" userId="055f424c-5a88-4e6e-9e88-d4462ff2eeee" providerId="ADAL" clId="{E82048AB-D5A0-4234-8747-CCB7F93DD359}" dt="2025-02-06T21:32:21.574" v="4126" actId="20577"/>
+          <ac:spMkLst>
+            <pc:docMk/>
+            <pc:sldMk cId="2745742810" sldId="257"/>
+            <ac:spMk id="3" creationId="{9C4BC62C-3BB8-B873-E9C9-0756E36D8EAF}"/>
+          </ac:spMkLst>
+        </pc:spChg>
+        <pc:spChg chg="add mod">
+          <ac:chgData name="Pien, Catarina L" userId="055f424c-5a88-4e6e-9e88-d4462ff2eeee" providerId="ADAL" clId="{E82048AB-D5A0-4234-8747-CCB7F93DD359}" dt="2025-02-06T21:10:39.959" v="2708" actId="1582"/>
+          <ac:spMkLst>
+            <pc:docMk/>
+            <pc:sldMk cId="2745742810" sldId="257"/>
+            <ac:spMk id="6" creationId="{699A5C1A-8278-E118-775B-8D9A793FE8A1}"/>
+          </ac:spMkLst>
+        </pc:spChg>
+        <pc:picChg chg="add mod">
+          <ac:chgData name="Pien, Catarina L" userId="055f424c-5a88-4e6e-9e88-d4462ff2eeee" providerId="ADAL" clId="{E82048AB-D5A0-4234-8747-CCB7F93DD359}" dt="2025-02-06T21:09:28.087" v="2700" actId="1076"/>
+          <ac:picMkLst>
+            <pc:docMk/>
+            <pc:sldMk cId="2745742810" sldId="257"/>
+            <ac:picMk id="5" creationId="{4DA619A3-2A04-CA1F-397A-A41B7997C950}"/>
+          </ac:picMkLst>
+        </pc:picChg>
+        <pc:cxnChg chg="add mod">
+          <ac:chgData name="Pien, Catarina L" userId="055f424c-5a88-4e6e-9e88-d4462ff2eeee" providerId="ADAL" clId="{E82048AB-D5A0-4234-8747-CCB7F93DD359}" dt="2025-02-06T21:12:27.628" v="2979" actId="14100"/>
+          <ac:cxnSpMkLst>
+            <pc:docMk/>
+            <pc:sldMk cId="2745742810" sldId="257"/>
+            <ac:cxnSpMk id="8" creationId="{DFADC195-1214-EDCE-27B4-8005062EB799}"/>
+          </ac:cxnSpMkLst>
+        </pc:cxnChg>
+      </pc:sldChg>
+      <pc:sldChg chg="modSp mod">
+        <pc:chgData name="Pien, Catarina L" userId="055f424c-5a88-4e6e-9e88-d4462ff2eeee" providerId="ADAL" clId="{E82048AB-D5A0-4234-8747-CCB7F93DD359}" dt="2025-02-06T21:14:52.694" v="3073" actId="20577"/>
+        <pc:sldMkLst>
+          <pc:docMk/>
+          <pc:sldMk cId="741744540" sldId="261"/>
+        </pc:sldMkLst>
+        <pc:spChg chg="mod">
+          <ac:chgData name="Pien, Catarina L" userId="055f424c-5a88-4e6e-9e88-d4462ff2eeee" providerId="ADAL" clId="{E82048AB-D5A0-4234-8747-CCB7F93DD359}" dt="2025-02-06T21:14:52.694" v="3073" actId="20577"/>
+          <ac:spMkLst>
+            <pc:docMk/>
+            <pc:sldMk cId="741744540" sldId="261"/>
+            <ac:spMk id="3" creationId="{91C7D7A3-E841-3368-7D75-F2B83A1BC6DF}"/>
+          </ac:spMkLst>
+        </pc:spChg>
+      </pc:sldChg>
+      <pc:sldChg chg="addSp delSp modSp mod">
+        <pc:chgData name="Pien, Catarina L" userId="055f424c-5a88-4e6e-9e88-d4462ff2eeee" providerId="ADAL" clId="{E82048AB-D5A0-4234-8747-CCB7F93DD359}" dt="2025-02-06T21:22:34.369" v="3278" actId="207"/>
+        <pc:sldMkLst>
+          <pc:docMk/>
+          <pc:sldMk cId="1467467805" sldId="263"/>
+        </pc:sldMkLst>
+        <pc:spChg chg="mod">
+          <ac:chgData name="Pien, Catarina L" userId="055f424c-5a88-4e6e-9e88-d4462ff2eeee" providerId="ADAL" clId="{E82048AB-D5A0-4234-8747-CCB7F93DD359}" dt="2025-02-06T21:22:34.369" v="3278" actId="207"/>
+          <ac:spMkLst>
+            <pc:docMk/>
+            <pc:sldMk cId="1467467805" sldId="263"/>
+            <ac:spMk id="3" creationId="{320F6579-86E7-1583-3CF0-B2365773E99F}"/>
+          </ac:spMkLst>
+        </pc:spChg>
+        <pc:spChg chg="add del mod">
+          <ac:chgData name="Pien, Catarina L" userId="055f424c-5a88-4e6e-9e88-d4462ff2eeee" providerId="ADAL" clId="{E82048AB-D5A0-4234-8747-CCB7F93DD359}" dt="2025-02-06T21:21:42.494" v="3259" actId="478"/>
+          <ac:spMkLst>
+            <pc:docMk/>
+            <pc:sldMk cId="1467467805" sldId="263"/>
+            <ac:spMk id="6" creationId="{7ED6CC36-4412-349E-9067-ABF25A1710B1}"/>
+          </ac:spMkLst>
+        </pc:spChg>
+        <pc:spChg chg="add mod">
+          <ac:chgData name="Pien, Catarina L" userId="055f424c-5a88-4e6e-9e88-d4462ff2eeee" providerId="ADAL" clId="{E82048AB-D5A0-4234-8747-CCB7F93DD359}" dt="2025-02-06T21:21:59.543" v="3263" actId="1582"/>
+          <ac:spMkLst>
+            <pc:docMk/>
+            <pc:sldMk cId="1467467805" sldId="263"/>
+            <ac:spMk id="7" creationId="{05D0F8D5-0A42-B0AE-5B4C-2C37AD397307}"/>
+          </ac:spMkLst>
+        </pc:spChg>
+        <pc:picChg chg="add mod">
+          <ac:chgData name="Pien, Catarina L" userId="055f424c-5a88-4e6e-9e88-d4462ff2eeee" providerId="ADAL" clId="{E82048AB-D5A0-4234-8747-CCB7F93DD359}" dt="2025-02-06T21:21:16.546" v="3257" actId="1076"/>
+          <ac:picMkLst>
+            <pc:docMk/>
+            <pc:sldMk cId="1467467805" sldId="263"/>
+            <ac:picMk id="5" creationId="{7519D3D7-5D08-0D53-0D05-ADDDE92A5C64}"/>
+          </ac:picMkLst>
+        </pc:picChg>
+        <pc:cxnChg chg="add mod">
+          <ac:chgData name="Pien, Catarina L" userId="055f424c-5a88-4e6e-9e88-d4462ff2eeee" providerId="ADAL" clId="{E82048AB-D5A0-4234-8747-CCB7F93DD359}" dt="2025-02-06T21:22:11.317" v="3266" actId="1582"/>
+          <ac:cxnSpMkLst>
+            <pc:docMk/>
+            <pc:sldMk cId="1467467805" sldId="263"/>
+            <ac:cxnSpMk id="9" creationId="{ED6A4C2C-B0A4-50E2-15ED-FD44B250EBEB}"/>
+          </ac:cxnSpMkLst>
+        </pc:cxnChg>
+      </pc:sldChg>
+      <pc:sldChg chg="modSp mod">
+        <pc:chgData name="Pien, Catarina L" userId="055f424c-5a88-4e6e-9e88-d4462ff2eeee" providerId="ADAL" clId="{E82048AB-D5A0-4234-8747-CCB7F93DD359}" dt="2025-02-06T21:23:20.266" v="3284" actId="20577"/>
+        <pc:sldMkLst>
+          <pc:docMk/>
+          <pc:sldMk cId="3251245353" sldId="264"/>
+        </pc:sldMkLst>
+        <pc:spChg chg="mod">
+          <ac:chgData name="Pien, Catarina L" userId="055f424c-5a88-4e6e-9e88-d4462ff2eeee" providerId="ADAL" clId="{E82048AB-D5A0-4234-8747-CCB7F93DD359}" dt="2025-02-06T21:23:20.266" v="3284" actId="20577"/>
+          <ac:spMkLst>
+            <pc:docMk/>
+            <pc:sldMk cId="3251245353" sldId="264"/>
+            <ac:spMk id="3" creationId="{90E94B3C-89C9-EE20-6B59-653C600EF1C3}"/>
+          </ac:spMkLst>
+        </pc:spChg>
+      </pc:sldChg>
+      <pc:sldChg chg="modSp del mod">
+        <pc:chgData name="Pien, Catarina L" userId="055f424c-5a88-4e6e-9e88-d4462ff2eeee" providerId="ADAL" clId="{E82048AB-D5A0-4234-8747-CCB7F93DD359}" dt="2025-02-06T16:35:54.652" v="986" actId="47"/>
+        <pc:sldMkLst>
+          <pc:docMk/>
+          <pc:sldMk cId="2779820459" sldId="265"/>
+        </pc:sldMkLst>
+        <pc:spChg chg="mod">
+          <ac:chgData name="Pien, Catarina L" userId="055f424c-5a88-4e6e-9e88-d4462ff2eeee" providerId="ADAL" clId="{E82048AB-D5A0-4234-8747-CCB7F93DD359}" dt="2025-02-06T16:35:27.540" v="985" actId="20577"/>
+          <ac:spMkLst>
+            <pc:docMk/>
+            <pc:sldMk cId="2779820459" sldId="265"/>
+            <ac:spMk id="3" creationId="{5993A34E-7BB0-F001-B585-81CA2CBAC26F}"/>
+          </ac:spMkLst>
+        </pc:spChg>
+      </pc:sldChg>
+      <pc:sldChg chg="modSp mod">
+        <pc:chgData name="Pien, Catarina L" userId="055f424c-5a88-4e6e-9e88-d4462ff2eeee" providerId="ADAL" clId="{E82048AB-D5A0-4234-8747-CCB7F93DD359}" dt="2025-02-06T21:24:39.391" v="3346" actId="20577"/>
+        <pc:sldMkLst>
+          <pc:docMk/>
+          <pc:sldMk cId="3915937312" sldId="266"/>
+        </pc:sldMkLst>
+        <pc:spChg chg="mod">
+          <ac:chgData name="Pien, Catarina L" userId="055f424c-5a88-4e6e-9e88-d4462ff2eeee" providerId="ADAL" clId="{E82048AB-D5A0-4234-8747-CCB7F93DD359}" dt="2025-02-06T21:24:39.391" v="3346" actId="20577"/>
+          <ac:spMkLst>
+            <pc:docMk/>
+            <pc:sldMk cId="3915937312" sldId="266"/>
+            <ac:spMk id="3" creationId="{31276B87-54C3-9E6A-927F-930A9BF85DC2}"/>
+          </ac:spMkLst>
+        </pc:spChg>
+      </pc:sldChg>
+      <pc:sldChg chg="modSp mod">
+        <pc:chgData name="Pien, Catarina L" userId="055f424c-5a88-4e6e-9e88-d4462ff2eeee" providerId="ADAL" clId="{E82048AB-D5A0-4234-8747-CCB7F93DD359}" dt="2025-02-06T21:31:35.200" v="4096"/>
+        <pc:sldMkLst>
+          <pc:docMk/>
+          <pc:sldMk cId="1803670861" sldId="269"/>
+        </pc:sldMkLst>
+        <pc:spChg chg="mod">
+          <ac:chgData name="Pien, Catarina L" userId="055f424c-5a88-4e6e-9e88-d4462ff2eeee" providerId="ADAL" clId="{E82048AB-D5A0-4234-8747-CCB7F93DD359}" dt="2025-02-06T21:31:35.200" v="4096"/>
+          <ac:spMkLst>
+            <pc:docMk/>
+            <pc:sldMk cId="1803670861" sldId="269"/>
+            <ac:spMk id="3" creationId="{6E085BBB-16B6-22A2-7ECA-89B918D12F00}"/>
+          </ac:spMkLst>
+        </pc:spChg>
+      </pc:sldChg>
+      <pc:sldChg chg="addSp modSp mod">
+        <pc:chgData name="Pien, Catarina L" userId="055f424c-5a88-4e6e-9e88-d4462ff2eeee" providerId="ADAL" clId="{E82048AB-D5A0-4234-8747-CCB7F93DD359}" dt="2025-02-06T21:29:35.908" v="3994" actId="1076"/>
+        <pc:sldMkLst>
+          <pc:docMk/>
+          <pc:sldMk cId="1931113386" sldId="270"/>
+        </pc:sldMkLst>
+        <pc:spChg chg="mod">
+          <ac:chgData name="Pien, Catarina L" userId="055f424c-5a88-4e6e-9e88-d4462ff2eeee" providerId="ADAL" clId="{E82048AB-D5A0-4234-8747-CCB7F93DD359}" dt="2025-02-06T21:29:35.908" v="3994" actId="1076"/>
+          <ac:spMkLst>
+            <pc:docMk/>
+            <pc:sldMk cId="1931113386" sldId="270"/>
+            <ac:spMk id="2" creationId="{79841153-B913-D2D8-F151-FA24F607944E}"/>
+          </ac:spMkLst>
+        </pc:spChg>
+        <pc:spChg chg="mod">
+          <ac:chgData name="Pien, Catarina L" userId="055f424c-5a88-4e6e-9e88-d4462ff2eeee" providerId="ADAL" clId="{E82048AB-D5A0-4234-8747-CCB7F93DD359}" dt="2025-02-06T21:29:29.225" v="3993" actId="27636"/>
+          <ac:spMkLst>
+            <pc:docMk/>
+            <pc:sldMk cId="1931113386" sldId="270"/>
+            <ac:spMk id="3" creationId="{2DE0815D-F699-B384-8D97-3D565C3BD690}"/>
+          </ac:spMkLst>
+        </pc:spChg>
+        <pc:spChg chg="add mod">
+          <ac:chgData name="Pien, Catarina L" userId="055f424c-5a88-4e6e-9e88-d4462ff2eeee" providerId="ADAL" clId="{E82048AB-D5A0-4234-8747-CCB7F93DD359}" dt="2025-02-06T21:27:02.550" v="3414" actId="14100"/>
+          <ac:spMkLst>
+            <pc:docMk/>
+            <pc:sldMk cId="1931113386" sldId="270"/>
+            <ac:spMk id="6" creationId="{91F0E778-8778-59E6-66F1-A6BEF39DF59F}"/>
+          </ac:spMkLst>
+        </pc:spChg>
+        <pc:picChg chg="add mod">
+          <ac:chgData name="Pien, Catarina L" userId="055f424c-5a88-4e6e-9e88-d4462ff2eeee" providerId="ADAL" clId="{E82048AB-D5A0-4234-8747-CCB7F93DD359}" dt="2025-02-06T21:26:19.210" v="3384" actId="14100"/>
+          <ac:picMkLst>
+            <pc:docMk/>
+            <pc:sldMk cId="1931113386" sldId="270"/>
+            <ac:picMk id="5" creationId="{6C6BCA40-0937-3F13-5620-9A0AD1B50240}"/>
+          </ac:picMkLst>
+        </pc:picChg>
+        <pc:cxnChg chg="add mod">
+          <ac:chgData name="Pien, Catarina L" userId="055f424c-5a88-4e6e-9e88-d4462ff2eeee" providerId="ADAL" clId="{E82048AB-D5A0-4234-8747-CCB7F93DD359}" dt="2025-02-06T21:27:18.905" v="3417" actId="14100"/>
+          <ac:cxnSpMkLst>
+            <pc:docMk/>
+            <pc:sldMk cId="1931113386" sldId="270"/>
+            <ac:cxnSpMk id="7" creationId="{BF2893C0-4044-7D4F-D140-FD53C4FC64E8}"/>
+          </ac:cxnSpMkLst>
+        </pc:cxnChg>
+      </pc:sldChg>
+      <pc:sldChg chg="addSp modSp mod">
+        <pc:chgData name="Pien, Catarina L" userId="055f424c-5a88-4e6e-9e88-d4462ff2eeee" providerId="ADAL" clId="{E82048AB-D5A0-4234-8747-CCB7F93DD359}" dt="2025-02-06T21:24:59.136" v="3376" actId="20577"/>
+        <pc:sldMkLst>
+          <pc:docMk/>
+          <pc:sldMk cId="1832299375" sldId="272"/>
+        </pc:sldMkLst>
+        <pc:spChg chg="mod">
+          <ac:chgData name="Pien, Catarina L" userId="055f424c-5a88-4e6e-9e88-d4462ff2eeee" providerId="ADAL" clId="{E82048AB-D5A0-4234-8747-CCB7F93DD359}" dt="2025-02-06T16:50:41.846" v="1821" actId="14100"/>
+          <ac:spMkLst>
+            <pc:docMk/>
+            <pc:sldMk cId="1832299375" sldId="272"/>
+            <ac:spMk id="2" creationId="{9E54DB66-F57F-D13E-A890-BA9169071969}"/>
+          </ac:spMkLst>
+        </pc:spChg>
+        <pc:spChg chg="mod">
+          <ac:chgData name="Pien, Catarina L" userId="055f424c-5a88-4e6e-9e88-d4462ff2eeee" providerId="ADAL" clId="{E82048AB-D5A0-4234-8747-CCB7F93DD359}" dt="2025-02-06T21:24:59.136" v="3376" actId="20577"/>
+          <ac:spMkLst>
+            <pc:docMk/>
+            <pc:sldMk cId="1832299375" sldId="272"/>
+            <ac:spMk id="3" creationId="{F9519420-30D5-DE0E-CCA3-E1AE3135E2A2}"/>
+          </ac:spMkLst>
+        </pc:spChg>
+        <pc:spChg chg="add mod">
+          <ac:chgData name="Pien, Catarina L" userId="055f424c-5a88-4e6e-9e88-d4462ff2eeee" providerId="ADAL" clId="{E82048AB-D5A0-4234-8747-CCB7F93DD359}" dt="2025-02-06T16:51:27.067" v="1832" actId="2711"/>
+          <ac:spMkLst>
+            <pc:docMk/>
+            <pc:sldMk cId="1832299375" sldId="272"/>
+            <ac:spMk id="5" creationId="{AD48C6BC-91DF-A6AA-8FFD-529086414E32}"/>
+          </ac:spMkLst>
+        </pc:spChg>
+      </pc:sldChg>
+      <pc:sldChg chg="addSp delSp modSp mod">
+        <pc:chgData name="Pien, Catarina L" userId="055f424c-5a88-4e6e-9e88-d4462ff2eeee" providerId="ADAL" clId="{E82048AB-D5A0-4234-8747-CCB7F93DD359}" dt="2025-02-06T21:14:33.739" v="3033" actId="1076"/>
+        <pc:sldMkLst>
+          <pc:docMk/>
+          <pc:sldMk cId="1302369842" sldId="273"/>
+        </pc:sldMkLst>
+        <pc:spChg chg="del">
+          <ac:chgData name="Pien, Catarina L" userId="055f424c-5a88-4e6e-9e88-d4462ff2eeee" providerId="ADAL" clId="{E82048AB-D5A0-4234-8747-CCB7F93DD359}" dt="2025-02-06T21:12:49.117" v="3029" actId="478"/>
+          <ac:spMkLst>
+            <pc:docMk/>
+            <pc:sldMk cId="1302369842" sldId="273"/>
+            <ac:spMk id="3" creationId="{A7936E50-6E41-6E61-B14D-5B68C7D0A4EE}"/>
+          </ac:spMkLst>
+        </pc:spChg>
+        <pc:picChg chg="add del mod">
+          <ac:chgData name="Pien, Catarina L" userId="055f424c-5a88-4e6e-9e88-d4462ff2eeee" providerId="ADAL" clId="{E82048AB-D5A0-4234-8747-CCB7F93DD359}" dt="2025-02-06T21:14:28.206" v="3031" actId="478"/>
+          <ac:picMkLst>
+            <pc:docMk/>
+            <pc:sldMk cId="1302369842" sldId="273"/>
+            <ac:picMk id="5" creationId="{1A6B3E81-3E26-56B4-8DCC-3C1183C0E734}"/>
+          </ac:picMkLst>
+        </pc:picChg>
+        <pc:picChg chg="add mod">
+          <ac:chgData name="Pien, Catarina L" userId="055f424c-5a88-4e6e-9e88-d4462ff2eeee" providerId="ADAL" clId="{E82048AB-D5A0-4234-8747-CCB7F93DD359}" dt="2025-02-06T21:14:33.739" v="3033" actId="1076"/>
+          <ac:picMkLst>
+            <pc:docMk/>
+            <pc:sldMk cId="1302369842" sldId="273"/>
+            <ac:picMk id="7" creationId="{948A5477-09BB-B9B0-EF96-3EDFA57F7201}"/>
+          </ac:picMkLst>
+        </pc:picChg>
+      </pc:sldChg>
+      <pc:sldChg chg="addSp modSp mod ord">
+        <pc:chgData name="Pien, Catarina L" userId="055f424c-5a88-4e6e-9e88-d4462ff2eeee" providerId="ADAL" clId="{E82048AB-D5A0-4234-8747-CCB7F93DD359}" dt="2025-02-06T21:34:26.342" v="4178" actId="20577"/>
+        <pc:sldMkLst>
+          <pc:docMk/>
+          <pc:sldMk cId="3007478219" sldId="274"/>
+        </pc:sldMkLst>
+        <pc:spChg chg="mod">
+          <ac:chgData name="Pien, Catarina L" userId="055f424c-5a88-4e6e-9e88-d4462ff2eeee" providerId="ADAL" clId="{E82048AB-D5A0-4234-8747-CCB7F93DD359}" dt="2025-02-06T21:32:30.032" v="4127" actId="1076"/>
+          <ac:spMkLst>
+            <pc:docMk/>
+            <pc:sldMk cId="3007478219" sldId="274"/>
+            <ac:spMk id="2" creationId="{7A053407-CDF0-B093-06DD-99432F9842E1}"/>
+          </ac:spMkLst>
+        </pc:spChg>
+        <pc:spChg chg="mod">
+          <ac:chgData name="Pien, Catarina L" userId="055f424c-5a88-4e6e-9e88-d4462ff2eeee" providerId="ADAL" clId="{E82048AB-D5A0-4234-8747-CCB7F93DD359}" dt="2025-02-06T21:34:26.342" v="4178" actId="20577"/>
+          <ac:spMkLst>
+            <pc:docMk/>
+            <pc:sldMk cId="3007478219" sldId="274"/>
+            <ac:spMk id="3" creationId="{73066FAE-4D55-7E58-782A-4A98F694D101}"/>
+          </ac:spMkLst>
+        </pc:spChg>
+        <pc:spChg chg="add mod">
+          <ac:chgData name="Pien, Catarina L" userId="055f424c-5a88-4e6e-9e88-d4462ff2eeee" providerId="ADAL" clId="{E82048AB-D5A0-4234-8747-CCB7F93DD359}" dt="2025-02-06T19:24:38.317" v="2377" actId="20577"/>
+          <ac:spMkLst>
+            <pc:docMk/>
+            <pc:sldMk cId="3007478219" sldId="274"/>
+            <ac:spMk id="4" creationId="{1B4519D8-AA3B-F7B1-BD94-4EF93AA0AE4C}"/>
+          </ac:spMkLst>
+        </pc:spChg>
+        <pc:spChg chg="add mod">
+          <ac:chgData name="Pien, Catarina L" userId="055f424c-5a88-4e6e-9e88-d4462ff2eeee" providerId="ADAL" clId="{E82048AB-D5A0-4234-8747-CCB7F93DD359}" dt="2025-02-06T16:35:06.771" v="959" actId="1076"/>
+          <ac:spMkLst>
+            <pc:docMk/>
+            <pc:sldMk cId="3007478219" sldId="274"/>
+            <ac:spMk id="6" creationId="{63013078-742F-8C69-7EEB-6CE6A14EEE3C}"/>
+          </ac:spMkLst>
+        </pc:spChg>
+        <pc:picChg chg="add mod">
+          <ac:chgData name="Pien, Catarina L" userId="055f424c-5a88-4e6e-9e88-d4462ff2eeee" providerId="ADAL" clId="{E82048AB-D5A0-4234-8747-CCB7F93DD359}" dt="2025-02-06T16:43:41.951" v="1111" actId="1076"/>
+          <ac:picMkLst>
+            <pc:docMk/>
+            <pc:sldMk cId="3007478219" sldId="274"/>
+            <ac:picMk id="8" creationId="{AEE92058-BE84-786F-64C2-F1D766227E32}"/>
+          </ac:picMkLst>
+        </pc:picChg>
+      </pc:sldChg>
+      <pc:sldChg chg="addSp modSp mod">
+        <pc:chgData name="Pien, Catarina L" userId="055f424c-5a88-4e6e-9e88-d4462ff2eeee" providerId="ADAL" clId="{E82048AB-D5A0-4234-8747-CCB7F93DD359}" dt="2025-02-06T21:16:40.435" v="3084" actId="207"/>
+        <pc:sldMkLst>
+          <pc:docMk/>
+          <pc:sldMk cId="797430869" sldId="275"/>
+        </pc:sldMkLst>
+        <pc:picChg chg="add mod">
+          <ac:chgData name="Pien, Catarina L" userId="055f424c-5a88-4e6e-9e88-d4462ff2eeee" providerId="ADAL" clId="{E82048AB-D5A0-4234-8747-CCB7F93DD359}" dt="2025-02-06T21:16:31.538" v="3083" actId="207"/>
+          <ac:picMkLst>
+            <pc:docMk/>
+            <pc:sldMk cId="797430869" sldId="275"/>
+            <ac:picMk id="5" creationId="{F7EB6B35-5178-40C6-AF43-567C504F1B91}"/>
+          </ac:picMkLst>
+        </pc:picChg>
+        <pc:picChg chg="add mod">
+          <ac:chgData name="Pien, Catarina L" userId="055f424c-5a88-4e6e-9e88-d4462ff2eeee" providerId="ADAL" clId="{E82048AB-D5A0-4234-8747-CCB7F93DD359}" dt="2025-02-06T21:16:40.435" v="3084" actId="207"/>
+          <ac:picMkLst>
+            <pc:docMk/>
+            <pc:sldMk cId="797430869" sldId="275"/>
+            <ac:picMk id="7" creationId="{87E39604-0F5D-BD50-E740-D588F5192440}"/>
+          </ac:picMkLst>
+        </pc:picChg>
+        <pc:picChg chg="add mod">
+          <ac:chgData name="Pien, Catarina L" userId="055f424c-5a88-4e6e-9e88-d4462ff2eeee" providerId="ADAL" clId="{E82048AB-D5A0-4234-8747-CCB7F93DD359}" dt="2025-02-06T21:16:40.435" v="3084" actId="207"/>
+          <ac:picMkLst>
+            <pc:docMk/>
+            <pc:sldMk cId="797430869" sldId="275"/>
+            <ac:picMk id="8" creationId="{6443203A-7A47-2CEB-EB2C-7260A3F9E350}"/>
+          </ac:picMkLst>
+        </pc:picChg>
+        <pc:picChg chg="add mod">
+          <ac:chgData name="Pien, Catarina L" userId="055f424c-5a88-4e6e-9e88-d4462ff2eeee" providerId="ADAL" clId="{E82048AB-D5A0-4234-8747-CCB7F93DD359}" dt="2025-02-06T21:16:40.435" v="3084" actId="207"/>
+          <ac:picMkLst>
+            <pc:docMk/>
+            <pc:sldMk cId="797430869" sldId="275"/>
+            <ac:picMk id="9" creationId="{D45DCE71-29E6-3847-16CD-F6650ED8ACF5}"/>
+          </ac:picMkLst>
+        </pc:picChg>
+      </pc:sldChg>
+      <pc:sldChg chg="addSp delSp modSp new mod">
+        <pc:chgData name="Pien, Catarina L" userId="055f424c-5a88-4e6e-9e88-d4462ff2eeee" providerId="ADAL" clId="{E82048AB-D5A0-4234-8747-CCB7F93DD359}" dt="2025-02-06T16:52:34.806" v="1841" actId="732"/>
+        <pc:sldMkLst>
+          <pc:docMk/>
+          <pc:sldMk cId="1140867898" sldId="276"/>
+        </pc:sldMkLst>
+        <pc:spChg chg="del">
+          <ac:chgData name="Pien, Catarina L" userId="055f424c-5a88-4e6e-9e88-d4462ff2eeee" providerId="ADAL" clId="{E82048AB-D5A0-4234-8747-CCB7F93DD359}" dt="2025-02-06T16:52:26.367" v="1840" actId="478"/>
+          <ac:spMkLst>
+            <pc:docMk/>
+            <pc:sldMk cId="1140867898" sldId="276"/>
+            <ac:spMk id="2" creationId="{609636E3-39C4-71F9-B697-826A10DA6015}"/>
+          </ac:spMkLst>
+        </pc:spChg>
+        <pc:spChg chg="del">
+          <ac:chgData name="Pien, Catarina L" userId="055f424c-5a88-4e6e-9e88-d4462ff2eeee" providerId="ADAL" clId="{E82048AB-D5A0-4234-8747-CCB7F93DD359}" dt="2025-02-06T16:52:20.031" v="1836" actId="478"/>
+          <ac:spMkLst>
+            <pc:docMk/>
+            <pc:sldMk cId="1140867898" sldId="276"/>
+            <ac:spMk id="3" creationId="{B762EA86-37E6-CAA8-9519-762FF4B4D202}"/>
+          </ac:spMkLst>
+        </pc:spChg>
+        <pc:picChg chg="add mod modCrop">
+          <ac:chgData name="Pien, Catarina L" userId="055f424c-5a88-4e6e-9e88-d4462ff2eeee" providerId="ADAL" clId="{E82048AB-D5A0-4234-8747-CCB7F93DD359}" dt="2025-02-06T16:52:34.806" v="1841" actId="732"/>
+          <ac:picMkLst>
+            <pc:docMk/>
+            <pc:sldMk cId="1140867898" sldId="276"/>
+            <ac:picMk id="5" creationId="{C584D33F-78E3-4504-1243-F793E2D515AD}"/>
+          </ac:picMkLst>
+        </pc:picChg>
+      </pc:sldChg>
+      <pc:sldChg chg="modSp new del mod">
+        <pc:chgData name="Pien, Catarina L" userId="055f424c-5a88-4e6e-9e88-d4462ff2eeee" providerId="ADAL" clId="{E82048AB-D5A0-4234-8747-CCB7F93DD359}" dt="2025-02-06T21:07:39.442" v="2558" actId="47"/>
+        <pc:sldMkLst>
+          <pc:docMk/>
+          <pc:sldMk cId="3760050061" sldId="277"/>
+        </pc:sldMkLst>
+        <pc:spChg chg="mod">
+          <ac:chgData name="Pien, Catarina L" userId="055f424c-5a88-4e6e-9e88-d4462ff2eeee" providerId="ADAL" clId="{E82048AB-D5A0-4234-8747-CCB7F93DD359}" dt="2025-02-06T19:20:47.438" v="2334" actId="20577"/>
+          <ac:spMkLst>
+            <pc:docMk/>
+            <pc:sldMk cId="3760050061" sldId="277"/>
+            <ac:spMk id="2" creationId="{2A91631B-1370-1D36-D5E5-09150BFA5BCF}"/>
+          </ac:spMkLst>
+        </pc:spChg>
+      </pc:sldChg>
+      <pc:sldChg chg="new del">
+        <pc:chgData name="Pien, Catarina L" userId="055f424c-5a88-4e6e-9e88-d4462ff2eeee" providerId="ADAL" clId="{E82048AB-D5A0-4234-8747-CCB7F93DD359}" dt="2025-02-06T20:18:50.334" v="2407" actId="680"/>
+        <pc:sldMkLst>
+          <pc:docMk/>
+          <pc:sldMk cId="1191678152" sldId="278"/>
+        </pc:sldMkLst>
+      </pc:sldChg>
+      <pc:sldChg chg="modSp add mod">
+        <pc:chgData name="Pien, Catarina L" userId="055f424c-5a88-4e6e-9e88-d4462ff2eeee" providerId="ADAL" clId="{E82048AB-D5A0-4234-8747-CCB7F93DD359}" dt="2025-02-06T21:30:31.409" v="4063" actId="2711"/>
+        <pc:sldMkLst>
+          <pc:docMk/>
+          <pc:sldMk cId="2572053775" sldId="278"/>
+        </pc:sldMkLst>
+        <pc:spChg chg="mod">
+          <ac:chgData name="Pien, Catarina L" userId="055f424c-5a88-4e6e-9e88-d4462ff2eeee" providerId="ADAL" clId="{E82048AB-D5A0-4234-8747-CCB7F93DD359}" dt="2025-02-06T20:18:58.353" v="2428" actId="20577"/>
+          <ac:spMkLst>
+            <pc:docMk/>
+            <pc:sldMk cId="2572053775" sldId="278"/>
+            <ac:spMk id="2" creationId="{615A50C0-FA6D-83B0-3C41-1DF0EC48433B}"/>
+          </ac:spMkLst>
+        </pc:spChg>
+        <pc:spChg chg="mod">
+          <ac:chgData name="Pien, Catarina L" userId="055f424c-5a88-4e6e-9e88-d4462ff2eeee" providerId="ADAL" clId="{E82048AB-D5A0-4234-8747-CCB7F93DD359}" dt="2025-02-06T21:30:31.409" v="4063" actId="2711"/>
+          <ac:spMkLst>
+            <pc:docMk/>
+            <pc:sldMk cId="2572053775" sldId="278"/>
+            <ac:spMk id="3" creationId="{F8E294DE-028C-A8E5-A57E-1F710375FB7E}"/>
+          </ac:spMkLst>
+        </pc:spChg>
+      </pc:sldChg>
+    </pc:docChg>
+  </pc:docChgLst>
+</pc:chgInfo>
 </file>
 
 <file path=ppt/notesMasters/notesMaster1.xml><?xml version="1.0" encoding="utf-8"?>
@@ -220,7 +667,7 @@
           <a:p>
             <a:fld id="{3EDDC399-40E9-4664-9071-AD918941D8A5}" type="datetimeFigureOut">
               <a:rPr lang="en-US" smtClean="0"/>
-              <a:t>12/6/2024</a:t>
+              <a:t>2/6/2025</a:t>
             </a:fld>
             <a:endParaRPr lang="en-US"/>
           </a:p>
@@ -655,7 +1102,7 @@
           <a:p>
             <a:fld id="{80604AA2-5DDE-400C-9292-02636E844051}" type="datetimeFigureOut">
               <a:rPr lang="en-US" smtClean="0"/>
-              <a:t>12/6/2024</a:t>
+              <a:t>2/6/2025</a:t>
             </a:fld>
             <a:endParaRPr lang="en-US"/>
           </a:p>
@@ -883,7 +1330,7 @@
           <a:p>
             <a:fld id="{80604AA2-5DDE-400C-9292-02636E844051}" type="datetimeFigureOut">
               <a:rPr lang="en-US" smtClean="0"/>
-              <a:t>12/6/2024</a:t>
+              <a:t>2/6/2025</a:t>
             </a:fld>
             <a:endParaRPr lang="en-US"/>
           </a:p>
@@ -1063,7 +1510,7 @@
           <a:p>
             <a:fld id="{80604AA2-5DDE-400C-9292-02636E844051}" type="datetimeFigureOut">
               <a:rPr lang="en-US" smtClean="0"/>
-              <a:t>12/6/2024</a:t>
+              <a:t>2/6/2025</a:t>
             </a:fld>
             <a:endParaRPr lang="en-US"/>
           </a:p>
@@ -1269,7 +1716,7 @@
           <a:p>
             <a:fld id="{80604AA2-5DDE-400C-9292-02636E844051}" type="datetimeFigureOut">
               <a:rPr lang="en-US" smtClean="0"/>
-              <a:t>12/6/2024</a:t>
+              <a:t>2/6/2025</a:t>
             </a:fld>
             <a:endParaRPr lang="en-US"/>
           </a:p>
@@ -1527,7 +1974,7 @@
           <a:p>
             <a:fld id="{80604AA2-5DDE-400C-9292-02636E844051}" type="datetimeFigureOut">
               <a:rPr lang="en-US" smtClean="0"/>
-              <a:t>12/6/2024</a:t>
+              <a:t>2/6/2025</a:t>
             </a:fld>
             <a:endParaRPr lang="en-US"/>
           </a:p>
@@ -1853,7 +2300,7 @@
           <a:p>
             <a:fld id="{80604AA2-5DDE-400C-9292-02636E844051}" type="datetimeFigureOut">
               <a:rPr lang="en-US" smtClean="0"/>
-              <a:t>12/6/2024</a:t>
+              <a:t>2/6/2025</a:t>
             </a:fld>
             <a:endParaRPr lang="en-US"/>
           </a:p>
@@ -2304,7 +2751,7 @@
           <a:p>
             <a:fld id="{80604AA2-5DDE-400C-9292-02636E844051}" type="datetimeFigureOut">
               <a:rPr lang="en-US" smtClean="0"/>
-              <a:t>12/6/2024</a:t>
+              <a:t>2/6/2025</a:t>
             </a:fld>
             <a:endParaRPr lang="en-US"/>
           </a:p>
@@ -2422,7 +2869,7 @@
           <a:p>
             <a:fld id="{80604AA2-5DDE-400C-9292-02636E844051}" type="datetimeFigureOut">
               <a:rPr lang="en-US" smtClean="0"/>
-              <a:t>12/6/2024</a:t>
+              <a:t>2/6/2025</a:t>
             </a:fld>
             <a:endParaRPr lang="en-US"/>
           </a:p>
@@ -2517,7 +2964,7 @@
           <a:p>
             <a:fld id="{80604AA2-5DDE-400C-9292-02636E844051}" type="datetimeFigureOut">
               <a:rPr lang="en-US" smtClean="0"/>
-              <a:t>12/6/2024</a:t>
+              <a:t>2/6/2025</a:t>
             </a:fld>
             <a:endParaRPr lang="en-US"/>
           </a:p>
@@ -2804,7 +3251,7 @@
           <a:p>
             <a:fld id="{80604AA2-5DDE-400C-9292-02636E844051}" type="datetimeFigureOut">
               <a:rPr lang="en-US" smtClean="0"/>
-              <a:t>12/6/2024</a:t>
+              <a:t>2/6/2025</a:t>
             </a:fld>
             <a:endParaRPr lang="en-US"/>
           </a:p>
@@ -3126,7 +3573,7 @@
           <a:p>
             <a:fld id="{80604AA2-5DDE-400C-9292-02636E844051}" type="datetimeFigureOut">
               <a:rPr lang="en-US" smtClean="0"/>
-              <a:t>12/6/2024</a:t>
+              <a:t>2/6/2025</a:t>
             </a:fld>
             <a:endParaRPr lang="en-US"/>
           </a:p>
@@ -3380,7 +3827,7 @@
           <a:p>
             <a:fld id="{80604AA2-5DDE-400C-9292-02636E844051}" type="datetimeFigureOut">
               <a:rPr lang="en-US" smtClean="0"/>
-              <a:t>12/6/2024</a:t>
+              <a:t>2/6/2025</a:t>
             </a:fld>
             <a:endParaRPr lang="en-US"/>
           </a:p>
@@ -4054,7 +4501,7 @@
           <p:cNvPr id="2" name="Title 1">
             <a:extLst>
               <a:ext uri="{FF2B5EF4-FFF2-40B4-BE49-F238E27FC236}">
-                <a16:creationId xmlns:a16="http://schemas.microsoft.com/office/drawing/2014/main" id="{98398CEC-9A81-A91D-3A80-1D362D061573}"/>
+                <a16:creationId xmlns:a16="http://schemas.microsoft.com/office/drawing/2014/main" id="{531BA11A-1A8A-8C48-054C-996817B83D76}"/>
               </a:ext>
             </a:extLst>
           </p:cNvPr>
@@ -4067,8 +4514,8 @@
         </p:nvSpPr>
         <p:spPr>
           <a:xfrm>
-            <a:off x="723900" y="365760"/>
-            <a:ext cx="10230612" cy="1325562"/>
+            <a:off x="1261872" y="758952"/>
+            <a:ext cx="9418320" cy="1857499"/>
           </a:xfrm>
         </p:spPr>
         <p:txBody>
@@ -4077,17 +4524,17 @@
           <a:p>
             <a:r>
               <a:rPr lang="en-US" dirty="0"/>
-              <a:t>OH NO – I did not want to commit that! </a:t>
-            </a:r>
-          </a:p>
-        </p:txBody>
-      </p:sp>
-      <p:sp>
-        <p:nvSpPr>
-          <p:cNvPr id="3" name="Content Placeholder 2">
+              <a:t>Other issues</a:t>
+            </a:r>
+          </a:p>
+        </p:txBody>
+      </p:sp>
+      <p:sp>
+        <p:nvSpPr>
+          <p:cNvPr id="3" name="Text Placeholder 2">
             <a:extLst>
               <a:ext uri="{FF2B5EF4-FFF2-40B4-BE49-F238E27FC236}">
-                <a16:creationId xmlns:a16="http://schemas.microsoft.com/office/drawing/2014/main" id="{320F6579-86E7-1583-3CF0-B2365773E99F}"/>
+                <a16:creationId xmlns:a16="http://schemas.microsoft.com/office/drawing/2014/main" id="{B6370AC5-2BBF-1542-7FAB-313691AFF0DC}"/>
               </a:ext>
             </a:extLst>
           </p:cNvPr>
@@ -4095,100 +4542,166 @@
             <a:spLocks noGrp="1"/>
           </p:cNvSpPr>
           <p:nvPr>
-            <p:ph idx="1"/>
+            <p:ph type="body" idx="1"/>
           </p:nvPr>
         </p:nvSpPr>
         <p:spPr/>
         <p:txBody>
-          <a:bodyPr>
-            <a:normAutofit/>
-          </a:bodyPr>
+          <a:bodyPr/>
           <a:lstStyle/>
           <a:p>
-            <a:r>
-              <a:rPr lang="en-US" dirty="0">
-                <a:hlinkClick r:id="rId2"/>
-              </a:rPr>
-              <a:t>How can I undo the last commit? | Learn Version Control with Git</a:t>
-            </a:r>
-            <a:endParaRPr lang="en-US" dirty="0"/>
-          </a:p>
-          <a:p>
-            <a:r>
-              <a:rPr lang="en-US" i="1" dirty="0"/>
-              <a:t>amend</a:t>
-            </a:r>
-            <a:r>
-              <a:rPr lang="en-US" dirty="0"/>
-              <a:t>: add to the last commit/change commit message</a:t>
-            </a:r>
-          </a:p>
-          <a:p>
-            <a:r>
-              <a:rPr lang="en-US" dirty="0"/>
-              <a:t>Work in the terminal</a:t>
-            </a:r>
-          </a:p>
-          <a:p>
-            <a:r>
-              <a:rPr lang="en-US" dirty="0"/>
-              <a:t>git reset --soft HEAD~1</a:t>
-            </a:r>
-          </a:p>
-          <a:p>
-            <a:pPr lvl="1"/>
-            <a:r>
-              <a:rPr lang="en-US" dirty="0"/>
-              <a:t>Rewind by 1</a:t>
-            </a:r>
-          </a:p>
-          <a:p>
-            <a:pPr lvl="1"/>
-            <a:r>
-              <a:rPr lang="en-US" dirty="0"/>
-              <a:t>Soft reset will keep the changes uncommitted</a:t>
-            </a:r>
-          </a:p>
-          <a:p>
-            <a:r>
-              <a:rPr lang="en-US" dirty="0"/>
-              <a:t>git reset --hard HEAD~1</a:t>
-            </a:r>
-          </a:p>
-          <a:p>
-            <a:pPr lvl="1"/>
-            <a:r>
-              <a:rPr lang="en-US" dirty="0"/>
-              <a:t>Hard reset will remove any changes you made since the previous commit</a:t>
-            </a:r>
-          </a:p>
-          <a:p>
-            <a:r>
-              <a:rPr lang="en-US" dirty="0"/>
-              <a:t>git reset --hard </a:t>
-            </a:r>
-            <a:r>
-              <a:rPr lang="en-US" i="1" dirty="0"/>
-              <a:t>hash</a:t>
-            </a:r>
-          </a:p>
-          <a:p>
-            <a:pPr lvl="1"/>
-            <a:r>
-              <a:rPr lang="en-US" dirty="0"/>
-              <a:t>Go to an older version of the file</a:t>
-            </a:r>
-          </a:p>
-          <a:p>
-            <a:pPr lvl="1"/>
-            <a:endParaRPr lang="en-US" dirty="0"/>
-          </a:p>
-        </p:txBody>
-      </p:sp>
+            <a:endParaRPr lang="en-US"/>
+          </a:p>
+        </p:txBody>
+      </p:sp>
+      <p:pic>
+        <p:nvPicPr>
+          <p:cNvPr id="5" name="Graphic 4" descr="Lost with solid fill">
+            <a:extLst>
+              <a:ext uri="{FF2B5EF4-FFF2-40B4-BE49-F238E27FC236}">
+                <a16:creationId xmlns:a16="http://schemas.microsoft.com/office/drawing/2014/main" id="{F7EB6B35-5178-40C6-AF43-567C504F1B91}"/>
+              </a:ext>
+            </a:extLst>
+          </p:cNvPr>
+          <p:cNvPicPr>
+            <a:picLocks noChangeAspect="1"/>
+          </p:cNvPicPr>
+          <p:nvPr/>
+        </p:nvPicPr>
+        <p:blipFill>
+          <a:blip r:embed="rId2">
+            <a:extLst>
+              <a:ext uri="{96DAC541-7B7A-43D3-8B79-37D633B846F1}">
+                <asvg:svgBlip xmlns:asvg="http://schemas.microsoft.com/office/drawing/2016/SVG/main" r:embed="rId3"/>
+              </a:ext>
+            </a:extLst>
+          </a:blip>
+          <a:stretch>
+            <a:fillRect/>
+          </a:stretch>
+        </p:blipFill>
+        <p:spPr>
+          <a:xfrm>
+            <a:off x="3152775" y="3121800"/>
+            <a:ext cx="1691640" cy="1691640"/>
+          </a:xfrm>
+          <a:prstGeom prst="rect">
+            <a:avLst/>
+          </a:prstGeom>
+        </p:spPr>
+      </p:pic>
+      <p:pic>
+        <p:nvPicPr>
+          <p:cNvPr id="7" name="Graphic 6" descr="Question mark with solid fill">
+            <a:extLst>
+              <a:ext uri="{FF2B5EF4-FFF2-40B4-BE49-F238E27FC236}">
+                <a16:creationId xmlns:a16="http://schemas.microsoft.com/office/drawing/2014/main" id="{87E39604-0F5D-BD50-E740-D588F5192440}"/>
+              </a:ext>
+            </a:extLst>
+          </p:cNvPr>
+          <p:cNvPicPr>
+            <a:picLocks noChangeAspect="1"/>
+          </p:cNvPicPr>
+          <p:nvPr/>
+        </p:nvPicPr>
+        <p:blipFill>
+          <a:blip r:embed="rId4">
+            <a:extLst>
+              <a:ext uri="{96DAC541-7B7A-43D3-8B79-37D633B846F1}">
+                <asvg:svgBlip xmlns:asvg="http://schemas.microsoft.com/office/drawing/2016/SVG/main" r:embed="rId5"/>
+              </a:ext>
+            </a:extLst>
+          </a:blip>
+          <a:stretch>
+            <a:fillRect/>
+          </a:stretch>
+        </p:blipFill>
+        <p:spPr>
+          <a:xfrm>
+            <a:off x="6407925" y="673875"/>
+            <a:ext cx="914400" cy="914400"/>
+          </a:xfrm>
+          <a:prstGeom prst="rect">
+            <a:avLst/>
+          </a:prstGeom>
+        </p:spPr>
+      </p:pic>
+      <p:pic>
+        <p:nvPicPr>
+          <p:cNvPr id="8" name="Graphic 7" descr="Question mark with solid fill">
+            <a:extLst>
+              <a:ext uri="{FF2B5EF4-FFF2-40B4-BE49-F238E27FC236}">
+                <a16:creationId xmlns:a16="http://schemas.microsoft.com/office/drawing/2014/main" id="{6443203A-7A47-2CEB-EB2C-7260A3F9E350}"/>
+              </a:ext>
+            </a:extLst>
+          </p:cNvPr>
+          <p:cNvPicPr>
+            <a:picLocks noChangeAspect="1"/>
+          </p:cNvPicPr>
+          <p:nvPr/>
+        </p:nvPicPr>
+        <p:blipFill>
+          <a:blip r:embed="rId4">
+            <a:extLst>
+              <a:ext uri="{96DAC541-7B7A-43D3-8B79-37D633B846F1}">
+                <asvg:svgBlip xmlns:asvg="http://schemas.microsoft.com/office/drawing/2016/SVG/main" r:embed="rId5"/>
+              </a:ext>
+            </a:extLst>
+          </a:blip>
+          <a:stretch>
+            <a:fillRect/>
+          </a:stretch>
+        </p:blipFill>
+        <p:spPr>
+          <a:xfrm>
+            <a:off x="7474725" y="1230501"/>
+            <a:ext cx="914400" cy="914400"/>
+          </a:xfrm>
+          <a:prstGeom prst="rect">
+            <a:avLst/>
+          </a:prstGeom>
+        </p:spPr>
+      </p:pic>
+      <p:pic>
+        <p:nvPicPr>
+          <p:cNvPr id="9" name="Graphic 8" descr="Question mark with solid fill">
+            <a:extLst>
+              <a:ext uri="{FF2B5EF4-FFF2-40B4-BE49-F238E27FC236}">
+                <a16:creationId xmlns:a16="http://schemas.microsoft.com/office/drawing/2014/main" id="{D45DCE71-29E6-3847-16CD-F6650ED8ACF5}"/>
+              </a:ext>
+            </a:extLst>
+          </p:cNvPr>
+          <p:cNvPicPr>
+            <a:picLocks noChangeAspect="1"/>
+          </p:cNvPicPr>
+          <p:nvPr/>
+        </p:nvPicPr>
+        <p:blipFill>
+          <a:blip r:embed="rId4">
+            <a:extLst>
+              <a:ext uri="{96DAC541-7B7A-43D3-8B79-37D633B846F1}">
+                <asvg:svgBlip xmlns:asvg="http://schemas.microsoft.com/office/drawing/2016/SVG/main" r:embed="rId5"/>
+              </a:ext>
+            </a:extLst>
+          </a:blip>
+          <a:stretch>
+            <a:fillRect/>
+          </a:stretch>
+        </p:blipFill>
+        <p:spPr>
+          <a:xfrm>
+            <a:off x="6627000" y="2057400"/>
+            <a:ext cx="914400" cy="914400"/>
+          </a:xfrm>
+          <a:prstGeom prst="rect">
+            <a:avLst/>
+          </a:prstGeom>
+        </p:spPr>
+      </p:pic>
     </p:spTree>
     <p:extLst>
       <p:ext uri="{BB962C8B-B14F-4D97-AF65-F5344CB8AC3E}">
-        <p14:creationId xmlns:p14="http://schemas.microsoft.com/office/powerpoint/2010/main" val="1467467805"/>
+        <p14:creationId xmlns:p14="http://schemas.microsoft.com/office/powerpoint/2010/main" val="797430869"/>
       </p:ext>
     </p:extLst>
   </p:cSld>
@@ -4220,7 +4733,7 @@
           <p:cNvPr id="2" name="Title 1">
             <a:extLst>
               <a:ext uri="{FF2B5EF4-FFF2-40B4-BE49-F238E27FC236}">
-                <a16:creationId xmlns:a16="http://schemas.microsoft.com/office/drawing/2014/main" id="{E2B17A71-7404-7A98-29FA-B0E7EF9C7508}"/>
+                <a16:creationId xmlns:a16="http://schemas.microsoft.com/office/drawing/2014/main" id="{2ABAABEA-BD47-3A43-95D7-330DC5782799}"/>
               </a:ext>
             </a:extLst>
           </p:cNvPr>
@@ -4231,14 +4744,19 @@
             <p:ph type="title"/>
           </p:nvPr>
         </p:nvSpPr>
-        <p:spPr/>
+        <p:spPr>
+          <a:xfrm>
+            <a:off x="713232" y="257118"/>
+            <a:ext cx="9692640" cy="1073741"/>
+          </a:xfrm>
+        </p:spPr>
         <p:txBody>
           <a:bodyPr/>
           <a:lstStyle/>
           <a:p>
             <a:r>
               <a:rPr lang="en-US" dirty="0"/>
-              <a:t>Go back to an older version of a file</a:t>
+              <a:t>When you have a lot of files to add:</a:t>
             </a:r>
           </a:p>
         </p:txBody>
@@ -4248,7 +4766,7 @@
           <p:cNvPr id="3" name="Content Placeholder 2">
             <a:extLst>
               <a:ext uri="{FF2B5EF4-FFF2-40B4-BE49-F238E27FC236}">
-                <a16:creationId xmlns:a16="http://schemas.microsoft.com/office/drawing/2014/main" id="{31276B87-54C3-9E6A-927F-930A9BF85DC2}"/>
+                <a16:creationId xmlns:a16="http://schemas.microsoft.com/office/drawing/2014/main" id="{90E94B3C-89C9-EE20-6B59-653C600EF1C3}"/>
               </a:ext>
             </a:extLst>
           </p:cNvPr>
@@ -4262,93 +4780,56 @@
         <p:spPr/>
         <p:txBody>
           <a:bodyPr>
-            <a:normAutofit/>
+            <a:normAutofit lnSpcReduction="10000"/>
           </a:bodyPr>
           <a:lstStyle/>
           <a:p>
             <a:r>
               <a:rPr lang="en-US" dirty="0"/>
-              <a:t>Create a new branch</a:t>
+              <a:t>It can be slow to manually click a bunch of files to add for commit, and sometimes there is a lag after you click</a:t>
+            </a:r>
+          </a:p>
+          <a:p>
+            <a:r>
+              <a:rPr lang="en-US" dirty="0"/>
+              <a:t>Navigate to the “Terminal” tab of the console window:</a:t>
             </a:r>
           </a:p>
           <a:p>
             <a:pPr lvl="1"/>
             <a:r>
               <a:rPr lang="en-US" dirty="0"/>
-              <a:t>git checkout –b “</a:t>
-            </a:r>
-            <a:r>
-              <a:rPr lang="en-US" i="1" dirty="0"/>
-              <a:t>new-branch-name</a:t>
-            </a:r>
-            <a:r>
-              <a:rPr lang="en-US" dirty="0"/>
-              <a:t>”</a:t>
-            </a:r>
-          </a:p>
-          <a:p>
-            <a:r>
-              <a:rPr lang="en-US" dirty="0"/>
-              <a:t>Restore older files</a:t>
-            </a:r>
-          </a:p>
-          <a:p>
-            <a:pPr lvl="1"/>
-            <a:r>
-              <a:rPr lang="en-US" dirty="0"/>
-              <a:t>git restore –source = </a:t>
-            </a:r>
-            <a:r>
-              <a:rPr lang="en-US" i="1" dirty="0"/>
-              <a:t>file hash</a:t>
+              <a:t>Check things are set up right</a:t>
+            </a:r>
+          </a:p>
+          <a:p>
+            <a:pPr lvl="2"/>
+            <a:r>
+              <a:rPr lang="en-US" dirty="0"/>
+              <a:t>git config --global user.name</a:t>
+            </a:r>
+          </a:p>
+          <a:p>
+            <a:pPr lvl="2"/>
+            <a:r>
+              <a:rPr lang="en-US" dirty="0"/>
+              <a:t>git config --global </a:t>
+            </a:r>
+            <a:r>
+              <a:rPr lang="en-US" dirty="0" err="1"/>
+              <a:t>user.email</a:t>
             </a:r>
             <a:endParaRPr lang="en-US" dirty="0"/>
           </a:p>
           <a:p>
             <a:pPr lvl="2"/>
             <a:r>
-              <a:rPr lang="en-US" dirty="0"/>
-              <a:t>Get hash by clicking on the clock and find SHA</a:t>
-            </a:r>
-          </a:p>
-          <a:p>
-            <a:r>
-              <a:rPr lang="en-US" dirty="0"/>
-              <a:t>Commit and push files</a:t>
-            </a:r>
-          </a:p>
-          <a:p>
-            <a:pPr lvl="1"/>
-            <a:r>
-              <a:rPr lang="en-US" dirty="0"/>
-              <a:t>git add path/file</a:t>
-            </a:r>
-          </a:p>
-          <a:p>
-            <a:pPr lvl="1"/>
-            <a:r>
-              <a:rPr lang="en-US" dirty="0"/>
-              <a:t>git commit –m “fixing things”</a:t>
-            </a:r>
-          </a:p>
-          <a:p>
-            <a:pPr lvl="1"/>
-            <a:r>
-              <a:rPr lang="en-US" dirty="0"/>
-              <a:t>git push</a:t>
-            </a:r>
-          </a:p>
-          <a:p>
-            <a:r>
-              <a:rPr lang="en-US" dirty="0"/>
-              <a:t>Merge updated  branch files back into the main branch</a:t>
-            </a:r>
-          </a:p>
-          <a:p>
-            <a:pPr lvl="1"/>
-            <a:r>
-              <a:rPr lang="en-US" dirty="0"/>
-              <a:t>git checkout main </a:t>
+              <a:rPr lang="en-US" dirty="0" err="1"/>
+              <a:t>pwd</a:t>
+            </a:r>
+            <a:r>
+              <a:rPr lang="en-US" dirty="0"/>
+              <a:t> </a:t>
             </a:r>
             <a:r>
               <a:rPr lang="en-US" dirty="0">
@@ -4356,29 +4837,76 @@
                   <a:srgbClr val="FF0000"/>
                 </a:solidFill>
               </a:rPr>
-              <a:t>or whatever the branch name is</a:t>
+              <a:t>print working directory</a:t>
             </a:r>
             <a:endParaRPr lang="en-US" dirty="0"/>
           </a:p>
           <a:p>
+            <a:r>
+              <a:rPr lang="en-US" dirty="0"/>
+              <a:t>Add all files to commit</a:t>
+            </a:r>
+          </a:p>
+          <a:p>
             <a:pPr lvl="1"/>
             <a:r>
               <a:rPr lang="en-US" dirty="0"/>
-              <a:t>git merge </a:t>
-            </a:r>
-            <a:r>
-              <a:rPr lang="en-US" i="1" dirty="0"/>
-              <a:t>new-branch-name</a:t>
+              <a:t>git add -A</a:t>
             </a:r>
           </a:p>
           <a:p>
             <a:pPr lvl="1"/>
-            <a:endParaRPr lang="en-US" dirty="0"/>
-          </a:p>
-          <a:p>
-            <a:pPr marL="457200" lvl="1" indent="0">
-              <a:buNone/>
-            </a:pPr>
+            <a:r>
+              <a:rPr lang="en-US" dirty="0"/>
+              <a:t>git commit -m “write your commit message”</a:t>
+            </a:r>
+          </a:p>
+          <a:p>
+            <a:pPr lvl="1"/>
+            <a:r>
+              <a:rPr lang="en-US" dirty="0"/>
+              <a:t>git status </a:t>
+            </a:r>
+            <a:r>
+              <a:rPr lang="en-US" dirty="0">
+                <a:solidFill>
+                  <a:srgbClr val="FF0000"/>
+                </a:solidFill>
+              </a:rPr>
+              <a:t>check the files that have been added, untracked, etc.</a:t>
+            </a:r>
+          </a:p>
+          <a:p>
+            <a:pPr lvl="1"/>
+            <a:r>
+              <a:rPr lang="en-US" dirty="0"/>
+              <a:t>git remote -v </a:t>
+            </a:r>
+            <a:r>
+              <a:rPr lang="en-US" dirty="0">
+                <a:solidFill>
+                  <a:srgbClr val="FF0000"/>
+                </a:solidFill>
+              </a:rPr>
+              <a:t>check which repo you are pushing to. Should already be set up if you are already linked to a repo.</a:t>
+            </a:r>
+          </a:p>
+          <a:p>
+            <a:pPr lvl="1"/>
+            <a:r>
+              <a:rPr lang="en-US" dirty="0"/>
+              <a:t>git pull</a:t>
+            </a:r>
+          </a:p>
+          <a:p>
+            <a:pPr lvl="1"/>
+            <a:r>
+              <a:rPr lang="en-US" dirty="0"/>
+              <a:t>git push</a:t>
+            </a:r>
+          </a:p>
+          <a:p>
+            <a:pPr lvl="1"/>
             <a:endParaRPr lang="en-US" dirty="0"/>
           </a:p>
         </p:txBody>
@@ -4386,7 +4914,7 @@
     </p:spTree>
     <p:extLst>
       <p:ext uri="{BB962C8B-B14F-4D97-AF65-F5344CB8AC3E}">
-        <p14:creationId xmlns:p14="http://schemas.microsoft.com/office/powerpoint/2010/main" val="3915937312"/>
+        <p14:creationId xmlns:p14="http://schemas.microsoft.com/office/powerpoint/2010/main" val="3251245353"/>
       </p:ext>
     </p:extLst>
   </p:cSld>
@@ -4418,7 +4946,7 @@
           <p:cNvPr id="2" name="Title 1">
             <a:extLst>
               <a:ext uri="{FF2B5EF4-FFF2-40B4-BE49-F238E27FC236}">
-                <a16:creationId xmlns:a16="http://schemas.microsoft.com/office/drawing/2014/main" id="{AA85C694-301B-AC93-DE35-B36E458CF5F8}"/>
+                <a16:creationId xmlns:a16="http://schemas.microsoft.com/office/drawing/2014/main" id="{98398CEC-9A81-A91D-3A80-1D362D061573}"/>
               </a:ext>
             </a:extLst>
           </p:cNvPr>
@@ -4431,8 +4959,8 @@
         </p:nvSpPr>
         <p:spPr>
           <a:xfrm>
-            <a:off x="999321" y="202797"/>
-            <a:ext cx="9692640" cy="1325562"/>
+            <a:off x="723900" y="365760"/>
+            <a:ext cx="10230612" cy="1325562"/>
           </a:xfrm>
         </p:spPr>
         <p:txBody>
@@ -4441,7 +4969,7 @@
           <a:p>
             <a:r>
               <a:rPr lang="en-US" dirty="0"/>
-              <a:t>Stashing</a:t>
+              <a:t>OH NO – I did not want to commit that! </a:t>
             </a:r>
           </a:p>
         </p:txBody>
@@ -4451,7 +4979,7 @@
           <p:cNvPr id="3" name="Content Placeholder 2">
             <a:extLst>
               <a:ext uri="{FF2B5EF4-FFF2-40B4-BE49-F238E27FC236}">
-                <a16:creationId xmlns:a16="http://schemas.microsoft.com/office/drawing/2014/main" id="{CF914A27-17FE-F1CE-D936-728C017976EF}"/>
+                <a16:creationId xmlns:a16="http://schemas.microsoft.com/office/drawing/2014/main" id="{320F6579-86E7-1583-3CF0-B2365773E99F}"/>
               </a:ext>
             </a:extLst>
           </p:cNvPr>
@@ -4464,13 +4992,13 @@
         </p:nvSpPr>
         <p:spPr>
           <a:xfrm>
-            <a:off x="838200" y="1690688"/>
-            <a:ext cx="10515600" cy="4737462"/>
+            <a:off x="337947" y="1960657"/>
+            <a:ext cx="8595360" cy="4840014"/>
           </a:xfrm>
         </p:spPr>
         <p:txBody>
           <a:bodyPr>
-            <a:normAutofit fontScale="92500" lnSpcReduction="10000"/>
+            <a:normAutofit/>
           </a:bodyPr>
           <a:lstStyle/>
           <a:p>
@@ -4478,14 +5006,18 @@
               <a:rPr lang="en-US" dirty="0">
                 <a:hlinkClick r:id="rId2"/>
               </a:rPr>
-              <a:t>What is the intended use-case for git stash? - Stack Overflow</a:t>
+              <a:t>How can I undo the last commit? | Learn Version Control with Git</a:t>
             </a:r>
             <a:endParaRPr lang="en-US" dirty="0"/>
           </a:p>
           <a:p>
             <a:r>
-              <a:rPr lang="en-US" dirty="0"/>
-              <a:t>Save un-committed changes (record current wd, but want to go back to clean wd)</a:t>
+              <a:rPr lang="en-US" i="1" dirty="0"/>
+              <a:t>amend</a:t>
+            </a:r>
+            <a:r>
+              <a:rPr lang="en-US" dirty="0"/>
+              <a:t>: add to the last commit/change commit message</a:t>
             </a:r>
           </a:p>
           <a:p>
@@ -4495,76 +5027,192 @@
             </a:r>
           </a:p>
           <a:p>
-            <a:r>
-              <a:rPr lang="en-US" dirty="0"/>
-              <a:t>git stash</a:t>
-            </a:r>
-          </a:p>
-          <a:p>
             <a:pPr lvl="1"/>
             <a:r>
               <a:rPr lang="en-US" dirty="0"/>
-              <a:t>Save uncommitted changes</a:t>
-            </a:r>
-          </a:p>
-          <a:p>
-            <a:r>
-              <a:rPr lang="en-US" dirty="0"/>
-              <a:t>git stash list</a:t>
+              <a:t>git reset --soft HEAD~1</a:t>
+            </a:r>
+          </a:p>
+          <a:p>
+            <a:pPr lvl="2"/>
+            <a:r>
+              <a:rPr lang="en-US" dirty="0"/>
+              <a:t>Rewind by 1</a:t>
+            </a:r>
+          </a:p>
+          <a:p>
+            <a:pPr lvl="2"/>
+            <a:r>
+              <a:rPr lang="en-US" dirty="0"/>
+              <a:t>Soft reset will keep the changes uncommitted</a:t>
             </a:r>
           </a:p>
           <a:p>
             <a:pPr lvl="1"/>
             <a:r>
               <a:rPr lang="en-US" dirty="0"/>
-              <a:t>List your stashes</a:t>
-            </a:r>
-          </a:p>
-          <a:p>
-            <a:r>
-              <a:rPr lang="en-US" dirty="0"/>
-              <a:t>git stash apply stash@{x}</a:t>
+              <a:t>git reset --hard HEAD~1</a:t>
+            </a:r>
+          </a:p>
+          <a:p>
+            <a:pPr lvl="2"/>
+            <a:r>
+              <a:rPr lang="en-US" dirty="0"/>
+              <a:t>Hard reset will remove any changes you made since the previous commit</a:t>
             </a:r>
           </a:p>
           <a:p>
             <a:pPr lvl="1"/>
             <a:r>
               <a:rPr lang="en-US" dirty="0"/>
-              <a:t>apply the uncommitted changes (x = stash number)</a:t>
-            </a:r>
-          </a:p>
-          <a:p>
-            <a:r>
-              <a:rPr lang="en-US" dirty="0"/>
-              <a:t>git stash pop stash@{x}</a:t>
-            </a:r>
-          </a:p>
-          <a:p>
-            <a:pPr lvl="1"/>
-            <a:r>
-              <a:rPr lang="en-US" dirty="0"/>
-              <a:t>Apply stash, remove from stash list</a:t>
-            </a:r>
-          </a:p>
-          <a:p>
-            <a:r>
-              <a:rPr lang="en-US" dirty="0"/>
-              <a:t>git stash apply stash@{x}</a:t>
-            </a:r>
-          </a:p>
-          <a:p>
-            <a:pPr lvl="1"/>
-            <a:r>
-              <a:rPr lang="en-US" dirty="0"/>
-              <a:t>Apply stash, keep on stash list</a:t>
-            </a:r>
-          </a:p>
-        </p:txBody>
-      </p:sp>
+              <a:t>git reset --hard </a:t>
+            </a:r>
+            <a:r>
+              <a:rPr lang="en-US" i="1" dirty="0">
+                <a:solidFill>
+                  <a:srgbClr val="00B050"/>
+                </a:solidFill>
+              </a:rPr>
+              <a:t>SHA(e.g. 91aec3ca)</a:t>
+            </a:r>
+          </a:p>
+          <a:p>
+            <a:pPr lvl="2"/>
+            <a:r>
+              <a:rPr lang="en-US" dirty="0"/>
+              <a:t>Go to an older version of the file</a:t>
+            </a:r>
+          </a:p>
+        </p:txBody>
+      </p:sp>
+      <p:pic>
+        <p:nvPicPr>
+          <p:cNvPr id="5" name="Picture 4">
+            <a:extLst>
+              <a:ext uri="{FF2B5EF4-FFF2-40B4-BE49-F238E27FC236}">
+                <a16:creationId xmlns:a16="http://schemas.microsoft.com/office/drawing/2014/main" id="{7519D3D7-5D08-0D53-0D05-ADDDE92A5C64}"/>
+              </a:ext>
+            </a:extLst>
+          </p:cNvPr>
+          <p:cNvPicPr>
+            <a:picLocks noChangeAspect="1"/>
+          </p:cNvPicPr>
+          <p:nvPr/>
+        </p:nvPicPr>
+        <p:blipFill>
+          <a:blip r:embed="rId3"/>
+          <a:stretch>
+            <a:fillRect/>
+          </a:stretch>
+        </p:blipFill>
+        <p:spPr>
+          <a:xfrm>
+            <a:off x="4400550" y="4739819"/>
+            <a:ext cx="6774180" cy="1752421"/>
+          </a:xfrm>
+          <a:prstGeom prst="rect">
+            <a:avLst/>
+          </a:prstGeom>
+        </p:spPr>
+      </p:pic>
+      <p:sp>
+        <p:nvSpPr>
+          <p:cNvPr id="7" name="Rectangle 6">
+            <a:extLst>
+              <a:ext uri="{FF2B5EF4-FFF2-40B4-BE49-F238E27FC236}">
+                <a16:creationId xmlns:a16="http://schemas.microsoft.com/office/drawing/2014/main" id="{05D0F8D5-0A42-B0AE-5B4C-2C37AD397307}"/>
+              </a:ext>
+            </a:extLst>
+          </p:cNvPr>
+          <p:cNvSpPr/>
+          <p:nvPr/>
+        </p:nvSpPr>
+        <p:spPr>
+          <a:xfrm>
+            <a:off x="10182225" y="5153025"/>
+            <a:ext cx="772287" cy="1238250"/>
+          </a:xfrm>
+          <a:prstGeom prst="rect">
+            <a:avLst/>
+          </a:prstGeom>
+          <a:noFill/>
+          <a:ln w="38100">
+            <a:solidFill>
+              <a:srgbClr val="00B050"/>
+            </a:solidFill>
+          </a:ln>
+        </p:spPr>
+        <p:style>
+          <a:lnRef idx="2">
+            <a:schemeClr val="accent1">
+              <a:shade val="15000"/>
+            </a:schemeClr>
+          </a:lnRef>
+          <a:fillRef idx="1">
+            <a:schemeClr val="accent1"/>
+          </a:fillRef>
+          <a:effectRef idx="0">
+            <a:schemeClr val="accent1"/>
+          </a:effectRef>
+          <a:fontRef idx="minor">
+            <a:schemeClr val="lt1"/>
+          </a:fontRef>
+        </p:style>
+        <p:txBody>
+          <a:bodyPr rtlCol="0" anchor="ctr"/>
+          <a:lstStyle/>
+          <a:p>
+            <a:pPr algn="ctr"/>
+            <a:endParaRPr lang="en-US"/>
+          </a:p>
+        </p:txBody>
+      </p:sp>
+      <p:cxnSp>
+        <p:nvCxnSpPr>
+          <p:cNvPr id="9" name="Straight Arrow Connector 8">
+            <a:extLst>
+              <a:ext uri="{FF2B5EF4-FFF2-40B4-BE49-F238E27FC236}">
+                <a16:creationId xmlns:a16="http://schemas.microsoft.com/office/drawing/2014/main" id="{ED6A4C2C-B0A4-50E2-15ED-FD44B250EBEB}"/>
+              </a:ext>
+            </a:extLst>
+          </p:cNvPr>
+          <p:cNvCxnSpPr/>
+          <p:nvPr/>
+        </p:nvCxnSpPr>
+        <p:spPr>
+          <a:xfrm flipH="1" flipV="1">
+            <a:off x="3712779" y="4844594"/>
+            <a:ext cx="6469446" cy="783696"/>
+          </a:xfrm>
+          <a:prstGeom prst="straightConnector1">
+            <a:avLst/>
+          </a:prstGeom>
+          <a:ln w="38100">
+            <a:solidFill>
+              <a:srgbClr val="00B050"/>
+            </a:solidFill>
+            <a:tailEnd type="triangle"/>
+          </a:ln>
+        </p:spPr>
+        <p:style>
+          <a:lnRef idx="1">
+            <a:schemeClr val="accent1"/>
+          </a:lnRef>
+          <a:fillRef idx="0">
+            <a:schemeClr val="accent1"/>
+          </a:fillRef>
+          <a:effectRef idx="0">
+            <a:schemeClr val="accent1"/>
+          </a:effectRef>
+          <a:fontRef idx="minor">
+            <a:schemeClr val="tx1"/>
+          </a:fontRef>
+        </p:style>
+      </p:cxnSp>
     </p:spTree>
     <p:extLst>
       <p:ext uri="{BB962C8B-B14F-4D97-AF65-F5344CB8AC3E}">
-        <p14:creationId xmlns:p14="http://schemas.microsoft.com/office/powerpoint/2010/main" val="1226291390"/>
+        <p14:creationId xmlns:p14="http://schemas.microsoft.com/office/powerpoint/2010/main" val="1467467805"/>
       </p:ext>
     </p:extLst>
   </p:cSld>
@@ -4596,7 +5244,7 @@
           <p:cNvPr id="2" name="Title 1">
             <a:extLst>
               <a:ext uri="{FF2B5EF4-FFF2-40B4-BE49-F238E27FC236}">
-                <a16:creationId xmlns:a16="http://schemas.microsoft.com/office/drawing/2014/main" id="{7A053407-CDF0-B093-06DD-99432F9842E1}"/>
+                <a16:creationId xmlns:a16="http://schemas.microsoft.com/office/drawing/2014/main" id="{E2B17A71-7404-7A98-29FA-B0E7EF9C7508}"/>
               </a:ext>
             </a:extLst>
           </p:cNvPr>
@@ -4614,7 +5262,7 @@
           <a:p>
             <a:r>
               <a:rPr lang="en-US" dirty="0"/>
-              <a:t>File structure organization </a:t>
+              <a:t>Go back to an older version of a file</a:t>
             </a:r>
           </a:p>
         </p:txBody>
@@ -4624,7 +5272,7 @@
           <p:cNvPr id="3" name="Content Placeholder 2">
             <a:extLst>
               <a:ext uri="{FF2B5EF4-FFF2-40B4-BE49-F238E27FC236}">
-                <a16:creationId xmlns:a16="http://schemas.microsoft.com/office/drawing/2014/main" id="{73066FAE-4D55-7E58-782A-4A98F694D101}"/>
+                <a16:creationId xmlns:a16="http://schemas.microsoft.com/office/drawing/2014/main" id="{31276B87-54C3-9E6A-927F-930A9BF85DC2}"/>
               </a:ext>
             </a:extLst>
           </p:cNvPr>
@@ -4637,17 +5285,168 @@
         </p:nvSpPr>
         <p:spPr/>
         <p:txBody>
-          <a:bodyPr/>
+          <a:bodyPr>
+            <a:normAutofit/>
+          </a:bodyPr>
           <a:lstStyle/>
           <a:p>
-            <a:endParaRPr lang="en-US"/>
+            <a:r>
+              <a:rPr lang="en-US" dirty="0"/>
+              <a:t>Create a new branch</a:t>
+            </a:r>
+          </a:p>
+          <a:p>
+            <a:pPr lvl="1"/>
+            <a:r>
+              <a:rPr lang="en-US" dirty="0"/>
+              <a:t>git checkout -b </a:t>
+            </a:r>
+            <a:r>
+              <a:rPr lang="en-US" dirty="0">
+                <a:solidFill>
+                  <a:srgbClr val="00B050"/>
+                </a:solidFill>
+              </a:rPr>
+              <a:t>“</a:t>
+            </a:r>
+            <a:r>
+              <a:rPr lang="en-US" i="1" dirty="0">
+                <a:solidFill>
+                  <a:srgbClr val="00B050"/>
+                </a:solidFill>
+              </a:rPr>
+              <a:t>new-branch-name</a:t>
+            </a:r>
+            <a:r>
+              <a:rPr lang="en-US" dirty="0">
+                <a:solidFill>
+                  <a:srgbClr val="00B050"/>
+                </a:solidFill>
+              </a:rPr>
+              <a:t>”</a:t>
+            </a:r>
+          </a:p>
+          <a:p>
+            <a:r>
+              <a:rPr lang="en-US" dirty="0"/>
+              <a:t>Restore older files</a:t>
+            </a:r>
+          </a:p>
+          <a:p>
+            <a:pPr lvl="1"/>
+            <a:r>
+              <a:rPr lang="en-US" dirty="0"/>
+              <a:t>git restore -source = </a:t>
+            </a:r>
+            <a:r>
+              <a:rPr lang="en-US" i="1" dirty="0">
+                <a:solidFill>
+                  <a:srgbClr val="00B050"/>
+                </a:solidFill>
+              </a:rPr>
+              <a:t>file SHA</a:t>
+            </a:r>
+            <a:endParaRPr lang="en-US" dirty="0">
+              <a:solidFill>
+                <a:srgbClr val="00B050"/>
+              </a:solidFill>
+            </a:endParaRPr>
+          </a:p>
+          <a:p>
+            <a:pPr lvl="2"/>
+            <a:r>
+              <a:rPr lang="en-US" dirty="0"/>
+              <a:t>Get hash by clicking on the clock and find SHA (see example on previous slide)</a:t>
+            </a:r>
+          </a:p>
+          <a:p>
+            <a:r>
+              <a:rPr lang="en-US" dirty="0"/>
+              <a:t>Commit and push files</a:t>
+            </a:r>
+          </a:p>
+          <a:p>
+            <a:pPr lvl="1"/>
+            <a:r>
+              <a:rPr lang="en-US" dirty="0"/>
+              <a:t>git add path/file</a:t>
+            </a:r>
+          </a:p>
+          <a:p>
+            <a:pPr lvl="1"/>
+            <a:r>
+              <a:rPr lang="en-US" dirty="0"/>
+              <a:t>git commit -m </a:t>
+            </a:r>
+            <a:r>
+              <a:rPr lang="en-US" i="1" dirty="0">
+                <a:solidFill>
+                  <a:srgbClr val="00B050"/>
+                </a:solidFill>
+              </a:rPr>
+              <a:t>“fixing things”</a:t>
+            </a:r>
+          </a:p>
+          <a:p>
+            <a:pPr lvl="1"/>
+            <a:r>
+              <a:rPr lang="en-US" dirty="0"/>
+              <a:t>git push</a:t>
+            </a:r>
+          </a:p>
+          <a:p>
+            <a:r>
+              <a:rPr lang="en-US" dirty="0"/>
+              <a:t>Merge updated  branch files back into the main branch</a:t>
+            </a:r>
+          </a:p>
+          <a:p>
+            <a:pPr lvl="1"/>
+            <a:r>
+              <a:rPr lang="en-US" dirty="0"/>
+              <a:t>git checkout main </a:t>
+            </a:r>
+            <a:r>
+              <a:rPr lang="en-US" dirty="0">
+                <a:solidFill>
+                  <a:srgbClr val="FF0000"/>
+                </a:solidFill>
+              </a:rPr>
+              <a:t>or whatever the branch name is</a:t>
+            </a:r>
+            <a:endParaRPr lang="en-US" dirty="0"/>
+          </a:p>
+          <a:p>
+            <a:pPr lvl="1"/>
+            <a:r>
+              <a:rPr lang="en-US" dirty="0"/>
+              <a:t>git merge </a:t>
+            </a:r>
+            <a:r>
+              <a:rPr lang="en-US" i="1" dirty="0">
+                <a:solidFill>
+                  <a:srgbClr val="00B050"/>
+                </a:solidFill>
+              </a:rPr>
+              <a:t>new-branch-name</a:t>
+            </a:r>
+          </a:p>
+          <a:p>
+            <a:pPr lvl="1"/>
+            <a:endParaRPr lang="en-US" dirty="0"/>
+          </a:p>
+          <a:p>
+            <a:pPr marL="457200" lvl="1" indent="0">
+              <a:buNone/>
+            </a:pPr>
+            <a:endParaRPr lang="en-US" dirty="0"/>
           </a:p>
         </p:txBody>
       </p:sp>
     </p:spTree>
     <p:extLst>
       <p:ext uri="{BB962C8B-B14F-4D97-AF65-F5344CB8AC3E}">
-        <p14:creationId xmlns:p14="http://schemas.microsoft.com/office/powerpoint/2010/main" val="3007478219"/>
+        <p14:creationId xmlns:p14="http://schemas.microsoft.com/office/powerpoint/2010/main" val="3915937312"/>
       </p:ext>
     </p:extLst>
   </p:cSld>
@@ -4679,7 +5478,7 @@
           <p:cNvPr id="2" name="Title 1">
             <a:extLst>
               <a:ext uri="{FF2B5EF4-FFF2-40B4-BE49-F238E27FC236}">
-                <a16:creationId xmlns:a16="http://schemas.microsoft.com/office/drawing/2014/main" id="{87664E86-4493-45E9-E7A3-63081069F56A}"/>
+                <a16:creationId xmlns:a16="http://schemas.microsoft.com/office/drawing/2014/main" id="{AA85C694-301B-AC93-DE35-B36E458CF5F8}"/>
               </a:ext>
             </a:extLst>
           </p:cNvPr>
@@ -4690,14 +5489,19 @@
             <p:ph type="title"/>
           </p:nvPr>
         </p:nvSpPr>
-        <p:spPr/>
+        <p:spPr>
+          <a:xfrm>
+            <a:off x="999321" y="202797"/>
+            <a:ext cx="9692640" cy="1325562"/>
+          </a:xfrm>
+        </p:spPr>
         <p:txBody>
           <a:bodyPr/>
           <a:lstStyle/>
           <a:p>
             <a:r>
               <a:rPr lang="en-US" dirty="0"/>
-              <a:t>Personal access tokens</a:t>
+              <a:t>Stashing</a:t>
             </a:r>
           </a:p>
         </p:txBody>
@@ -4707,7 +5511,7 @@
           <p:cNvPr id="3" name="Content Placeholder 2">
             <a:extLst>
               <a:ext uri="{FF2B5EF4-FFF2-40B4-BE49-F238E27FC236}">
-                <a16:creationId xmlns:a16="http://schemas.microsoft.com/office/drawing/2014/main" id="{5993A34E-7BB0-F001-B585-81CA2CBAC26F}"/>
+                <a16:creationId xmlns:a16="http://schemas.microsoft.com/office/drawing/2014/main" id="{CF914A27-17FE-F1CE-D936-728C017976EF}"/>
               </a:ext>
             </a:extLst>
           </p:cNvPr>
@@ -4718,19 +5522,109 @@
             <p:ph idx="1"/>
           </p:nvPr>
         </p:nvSpPr>
-        <p:spPr/>
-        <p:txBody>
-          <a:bodyPr/>
+        <p:spPr>
+          <a:xfrm>
+            <a:off x="838200" y="1690688"/>
+            <a:ext cx="10515600" cy="4737462"/>
+          </a:xfrm>
+        </p:spPr>
+        <p:txBody>
+          <a:bodyPr>
+            <a:normAutofit fontScale="92500" lnSpcReduction="10000"/>
+          </a:bodyPr>
           <a:lstStyle/>
           <a:p>
-            <a:endParaRPr lang="en-US"/>
+            <a:r>
+              <a:rPr lang="en-US" dirty="0">
+                <a:hlinkClick r:id="rId2"/>
+              </a:rPr>
+              <a:t>What is the intended use-case for git stash? - Stack Overflow</a:t>
+            </a:r>
+            <a:endParaRPr lang="en-US" dirty="0"/>
+          </a:p>
+          <a:p>
+            <a:r>
+              <a:rPr lang="en-US" dirty="0"/>
+              <a:t>Save un-committed changes (record current wd, but want to go back to clean wd)</a:t>
+            </a:r>
+          </a:p>
+          <a:p>
+            <a:r>
+              <a:rPr lang="en-US" dirty="0"/>
+              <a:t>Work in the terminal</a:t>
+            </a:r>
+          </a:p>
+          <a:p>
+            <a:r>
+              <a:rPr lang="en-US" dirty="0"/>
+              <a:t>git stash</a:t>
+            </a:r>
+          </a:p>
+          <a:p>
+            <a:pPr lvl="1"/>
+            <a:r>
+              <a:rPr lang="en-US" dirty="0"/>
+              <a:t>Save uncommitted changes</a:t>
+            </a:r>
+          </a:p>
+          <a:p>
+            <a:r>
+              <a:rPr lang="en-US" dirty="0"/>
+              <a:t>git stash list</a:t>
+            </a:r>
+          </a:p>
+          <a:p>
+            <a:pPr lvl="1"/>
+            <a:r>
+              <a:rPr lang="en-US" dirty="0"/>
+              <a:t>List your stashes</a:t>
+            </a:r>
+          </a:p>
+          <a:p>
+            <a:r>
+              <a:rPr lang="en-US" dirty="0"/>
+              <a:t>git stash apply stash@{x}</a:t>
+            </a:r>
+          </a:p>
+          <a:p>
+            <a:pPr lvl="1"/>
+            <a:r>
+              <a:rPr lang="en-US" dirty="0"/>
+              <a:t>apply the uncommitted changes (x = stash number)</a:t>
+            </a:r>
+          </a:p>
+          <a:p>
+            <a:r>
+              <a:rPr lang="en-US" dirty="0"/>
+              <a:t>git stash pop stash@{x}</a:t>
+            </a:r>
+          </a:p>
+          <a:p>
+            <a:pPr lvl="1"/>
+            <a:r>
+              <a:rPr lang="en-US" dirty="0"/>
+              <a:t>Apply stash, remove from stash list</a:t>
+            </a:r>
+          </a:p>
+          <a:p>
+            <a:r>
+              <a:rPr lang="en-US" dirty="0"/>
+              <a:t>git stash apply stash@{x}</a:t>
+            </a:r>
+          </a:p>
+          <a:p>
+            <a:pPr lvl="1"/>
+            <a:r>
+              <a:rPr lang="en-US" dirty="0"/>
+              <a:t>Apply stash, keep on stash list</a:t>
+            </a:r>
           </a:p>
         </p:txBody>
       </p:sp>
     </p:spTree>
     <p:extLst>
       <p:ext uri="{BB962C8B-B14F-4D97-AF65-F5344CB8AC3E}">
-        <p14:creationId xmlns:p14="http://schemas.microsoft.com/office/powerpoint/2010/main" val="2779820459"/>
+        <p14:creationId xmlns:p14="http://schemas.microsoft.com/office/powerpoint/2010/main" val="1226291390"/>
       </p:ext>
     </p:extLst>
   </p:cSld>
@@ -4773,7 +5667,12 @@
             <p:ph type="title"/>
           </p:nvPr>
         </p:nvSpPr>
-        <p:spPr/>
+        <p:spPr>
+          <a:xfrm>
+            <a:off x="1261872" y="365760"/>
+            <a:ext cx="9692640" cy="1005840"/>
+          </a:xfrm>
+        </p:spPr>
         <p:txBody>
           <a:bodyPr/>
           <a:lstStyle/>
@@ -4801,12 +5700,184 @@
             <p:ph idx="1"/>
           </p:nvPr>
         </p:nvSpPr>
-        <p:spPr/>
-        <p:txBody>
-          <a:bodyPr/>
+        <p:spPr>
+          <a:xfrm>
+            <a:off x="930796" y="1639614"/>
+            <a:ext cx="8595360" cy="4351337"/>
+          </a:xfrm>
+        </p:spPr>
+        <p:txBody>
+          <a:bodyPr>
+            <a:normAutofit lnSpcReduction="10000"/>
+          </a:bodyPr>
           <a:lstStyle/>
           <a:p>
-            <a:endParaRPr lang="en-US"/>
+            <a:r>
+              <a:rPr lang="en-US" dirty="0"/>
+              <a:t>Shareable website for an organization or a project</a:t>
+            </a:r>
+          </a:p>
+          <a:p>
+            <a:pPr lvl="1"/>
+            <a:r>
+              <a:rPr lang="en-US" dirty="0">
+                <a:hlinkClick r:id="rId2"/>
+              </a:rPr>
+              <a:t>Environmental Monitoring Program</a:t>
+            </a:r>
+            <a:r>
+              <a:rPr lang="en-US" dirty="0"/>
+              <a:t> (organization website)</a:t>
+            </a:r>
+          </a:p>
+          <a:p>
+            <a:pPr lvl="1"/>
+            <a:r>
+              <a:rPr lang="en-US" dirty="0">
+                <a:hlinkClick r:id="rId3"/>
+              </a:rPr>
+              <a:t>Brood Year 2021 Winter-Run Chinook Salmon Report</a:t>
+            </a:r>
+            <a:r>
+              <a:rPr lang="en-US" dirty="0"/>
+              <a:t> (</a:t>
+            </a:r>
+            <a:r>
+              <a:rPr lang="en-US" dirty="0" err="1"/>
+              <a:t>bookdown</a:t>
+            </a:r>
+            <a:r>
+              <a:rPr lang="en-US" dirty="0"/>
+              <a:t>)</a:t>
+            </a:r>
+          </a:p>
+          <a:p>
+            <a:pPr lvl="1"/>
+            <a:r>
+              <a:rPr lang="en-US" dirty="0">
+                <a:hlinkClick r:id="rId4"/>
+              </a:rPr>
+              <a:t>General Resources | 2024 IEP Data Management, Visualization, and Access Workshop</a:t>
+            </a:r>
+            <a:endParaRPr lang="en-US" dirty="0"/>
+          </a:p>
+          <a:p>
+            <a:r>
+              <a:rPr lang="en-US" dirty="0"/>
+              <a:t>Create a folder to hold materials for your page in your repository (e.g. docs/)</a:t>
+            </a:r>
+          </a:p>
+          <a:p>
+            <a:pPr lvl="1"/>
+            <a:r>
+              <a:rPr lang="en-US" dirty="0"/>
+              <a:t>Add files you want to include on the site</a:t>
+            </a:r>
+          </a:p>
+          <a:p>
+            <a:pPr lvl="1"/>
+            <a:r>
+              <a:rPr lang="en-US" dirty="0"/>
+              <a:t>Use index.md, index.html, or README.md for the entry site page, must be in the top level of your docs folder</a:t>
+            </a:r>
+          </a:p>
+          <a:p>
+            <a:r>
+              <a:rPr lang="en-US" dirty="0"/>
+              <a:t>Configure page</a:t>
+            </a:r>
+          </a:p>
+          <a:p>
+            <a:pPr lvl="1"/>
+            <a:r>
+              <a:rPr lang="en-US" dirty="0"/>
+              <a:t>Under repository, go to “Settings”</a:t>
+            </a:r>
+          </a:p>
+          <a:p>
+            <a:pPr lvl="1"/>
+            <a:r>
+              <a:rPr lang="en-US" dirty="0"/>
+              <a:t>In “Code and automation”, go to “Pages”</a:t>
+            </a:r>
+          </a:p>
+          <a:p>
+            <a:pPr lvl="1"/>
+            <a:r>
+              <a:rPr lang="en-US" dirty="0"/>
+              <a:t>Under “Build and deployment” click “Deploy from a branch”</a:t>
+            </a:r>
+          </a:p>
+          <a:p>
+            <a:pPr lvl="2"/>
+            <a:r>
+              <a:rPr lang="en-US" dirty="0"/>
+              <a:t>Select the folder you are deploying from</a:t>
+            </a:r>
+          </a:p>
+          <a:p>
+            <a:pPr lvl="1"/>
+            <a:r>
+              <a:rPr lang="en-US" dirty="0"/>
+              <a:t>You will see your webpage link after a bit at the top and can click “Visit site” (see following slide example)</a:t>
+            </a:r>
+          </a:p>
+          <a:p>
+            <a:pPr lvl="1"/>
+            <a:endParaRPr lang="en-US" dirty="0"/>
+          </a:p>
+          <a:p>
+            <a:pPr lvl="1"/>
+            <a:endParaRPr lang="en-US" dirty="0"/>
+          </a:p>
+          <a:p>
+            <a:pPr marL="274320" lvl="1" indent="0">
+              <a:buNone/>
+            </a:pPr>
+            <a:endParaRPr lang="en-US" dirty="0"/>
+          </a:p>
+        </p:txBody>
+      </p:sp>
+      <p:sp>
+        <p:nvSpPr>
+          <p:cNvPr id="5" name="TextBox 4">
+            <a:extLst>
+              <a:ext uri="{FF2B5EF4-FFF2-40B4-BE49-F238E27FC236}">
+                <a16:creationId xmlns:a16="http://schemas.microsoft.com/office/drawing/2014/main" id="{AD48C6BC-91DF-A6AA-8FFD-529086414E32}"/>
+              </a:ext>
+            </a:extLst>
+          </p:cNvPr>
+          <p:cNvSpPr txBox="1"/>
+          <p:nvPr/>
+        </p:nvSpPr>
+        <p:spPr>
+          <a:xfrm>
+            <a:off x="5409543" y="6258965"/>
+            <a:ext cx="6105196" cy="369332"/>
+          </a:xfrm>
+          <a:prstGeom prst="rect">
+            <a:avLst/>
+          </a:prstGeom>
+          <a:noFill/>
+        </p:spPr>
+        <p:txBody>
+          <a:bodyPr wrap="square">
+            <a:spAutoFit/>
+          </a:bodyPr>
+          <a:lstStyle/>
+          <a:p>
+            <a:r>
+              <a:rPr lang="en-US" dirty="0">
+                <a:latin typeface="Segoe UI" panose="020B0502040204020203" pitchFamily="34" charset="0"/>
+                <a:cs typeface="Segoe UI" panose="020B0502040204020203" pitchFamily="34" charset="0"/>
+                <a:hlinkClick r:id="rId5"/>
+              </a:rPr>
+              <a:t>Creating a GitHub Pages site - GitHub Docs</a:t>
+            </a:r>
+            <a:endParaRPr lang="en-US" dirty="0">
+              <a:latin typeface="Segoe UI" panose="020B0502040204020203" pitchFamily="34" charset="0"/>
+              <a:cs typeface="Segoe UI" panose="020B0502040204020203" pitchFamily="34" charset="0"/>
+            </a:endParaRPr>
           </a:p>
         </p:txBody>
       </p:sp>
@@ -4840,6 +5911,65 @@
           <a:chExt cx="0" cy="0"/>
         </a:xfrm>
       </p:grpSpPr>
+      <p:pic>
+        <p:nvPicPr>
+          <p:cNvPr id="5" name="Picture 4">
+            <a:extLst>
+              <a:ext uri="{FF2B5EF4-FFF2-40B4-BE49-F238E27FC236}">
+                <a16:creationId xmlns:a16="http://schemas.microsoft.com/office/drawing/2014/main" id="{C584D33F-78E3-4504-1243-F793E2D515AD}"/>
+              </a:ext>
+            </a:extLst>
+          </p:cNvPr>
+          <p:cNvPicPr>
+            <a:picLocks noChangeAspect="1"/>
+          </p:cNvPicPr>
+          <p:nvPr/>
+        </p:nvPicPr>
+        <p:blipFill>
+          <a:blip r:embed="rId2"/>
+          <a:srcRect r="6604"/>
+          <a:stretch/>
+        </p:blipFill>
+        <p:spPr>
+          <a:xfrm>
+            <a:off x="366711" y="1092517"/>
+            <a:ext cx="10910889" cy="4672965"/>
+          </a:xfrm>
+          <a:prstGeom prst="rect">
+            <a:avLst/>
+          </a:prstGeom>
+        </p:spPr>
+      </p:pic>
+    </p:spTree>
+    <p:extLst>
+      <p:ext uri="{BB962C8B-B14F-4D97-AF65-F5344CB8AC3E}">
+        <p14:creationId xmlns:p14="http://schemas.microsoft.com/office/powerpoint/2010/main" val="1140867898"/>
+      </p:ext>
+    </p:extLst>
+  </p:cSld>
+  <p:clrMapOvr>
+    <a:masterClrMapping/>
+  </p:clrMapOvr>
+</p:sld>
+</file>
+
+<file path=ppt/slides/slide17.xml><?xml version="1.0" encoding="utf-8"?>
+<p:sld xmlns:a="http://schemas.openxmlformats.org/drawingml/2006/main" xmlns:r="http://schemas.openxmlformats.org/officeDocument/2006/relationships" xmlns:p="http://schemas.openxmlformats.org/presentationml/2006/main">
+  <p:cSld>
+    <p:spTree>
+      <p:nvGrpSpPr>
+        <p:cNvPr id="1" name=""/>
+        <p:cNvGrpSpPr/>
+        <p:nvPr/>
+      </p:nvGrpSpPr>
+      <p:grpSpPr>
+        <a:xfrm>
+          <a:off x="0" y="0"/>
+          <a:ext cx="0" cy="0"/>
+          <a:chOff x="0" y="0"/>
+          <a:chExt cx="0" cy="0"/>
+        </a:xfrm>
+      </p:grpSpPr>
       <p:sp>
         <p:nvSpPr>
           <p:cNvPr id="2" name="Title 1">
@@ -4856,9 +5986,16 @@
             <p:ph type="title"/>
           </p:nvPr>
         </p:nvSpPr>
-        <p:spPr/>
-        <p:txBody>
-          <a:bodyPr/>
+        <p:spPr>
+          <a:xfrm>
+            <a:off x="1138047" y="180654"/>
+            <a:ext cx="9692640" cy="610242"/>
+          </a:xfrm>
+        </p:spPr>
+        <p:txBody>
+          <a:bodyPr>
+            <a:normAutofit fontScale="90000"/>
+          </a:bodyPr>
           <a:lstStyle/>
           <a:p>
             <a:r>
@@ -4884,15 +6021,245 @@
             <p:ph idx="1"/>
           </p:nvPr>
         </p:nvSpPr>
-        <p:spPr/>
-        <p:txBody>
-          <a:bodyPr/>
+        <p:spPr>
+          <a:xfrm>
+            <a:off x="342900" y="1057276"/>
+            <a:ext cx="5753100" cy="5572124"/>
+          </a:xfrm>
+        </p:spPr>
+        <p:txBody>
+          <a:bodyPr>
+            <a:normAutofit fontScale="92500" lnSpcReduction="20000"/>
+          </a:bodyPr>
           <a:lstStyle/>
           <a:p>
+            <a:r>
+              <a:rPr lang="en-US" dirty="0"/>
+              <a:t>Collaboration technique</a:t>
+            </a:r>
+          </a:p>
+          <a:p>
+            <a:r>
+              <a:rPr lang="en-US" dirty="0"/>
+              <a:t>Submit requests for changing the code in a collaborative project</a:t>
+            </a:r>
+          </a:p>
+          <a:p>
+            <a:pPr lvl="1"/>
+            <a:r>
+              <a:rPr lang="en-US" dirty="0"/>
+              <a:t>E.g. as a level of review when you are updating code</a:t>
+            </a:r>
+          </a:p>
+          <a:p>
+            <a:pPr lvl="1"/>
+            <a:r>
+              <a:rPr lang="en-US" dirty="0"/>
+              <a:t>E.g. to suggest update to a package when you notice an error</a:t>
+            </a:r>
+          </a:p>
+          <a:p>
+            <a:r>
+              <a:rPr lang="en-US" dirty="0"/>
+              <a:t>Create a branch. Make changes in a branch, commit and push to repo.</a:t>
+            </a:r>
+          </a:p>
+          <a:p>
+            <a:r>
+              <a:rPr lang="en-US" dirty="0"/>
+              <a:t>On </a:t>
+            </a:r>
+            <a:r>
+              <a:rPr lang="en-US" dirty="0" err="1"/>
+              <a:t>github</a:t>
+            </a:r>
+            <a:r>
+              <a:rPr lang="en-US" dirty="0"/>
+              <a:t>, “Create pull request”</a:t>
+            </a:r>
+          </a:p>
+          <a:p>
+            <a:pPr lvl="1"/>
+            <a:r>
+              <a:rPr lang="en-US" dirty="0"/>
+              <a:t>Compare main and branch</a:t>
+            </a:r>
+          </a:p>
+          <a:p>
+            <a:pPr lvl="1"/>
+            <a:r>
+              <a:rPr lang="en-US" dirty="0"/>
+              <a:t>Click “Create pull request”</a:t>
+            </a:r>
+          </a:p>
+          <a:p>
+            <a:pPr lvl="1"/>
+            <a:r>
+              <a:rPr lang="en-US" dirty="0"/>
+              <a:t>Add the people you want to review your request, and add any comments to describe the request</a:t>
+            </a:r>
+          </a:p>
+          <a:p>
+            <a:r>
+              <a:rPr lang="en-US" dirty="0"/>
+              <a:t>The reviewers will get a notification in their email about the request. </a:t>
+            </a:r>
+          </a:p>
+          <a:p>
+            <a:pPr lvl="1"/>
+            <a:r>
+              <a:rPr lang="en-US" dirty="0"/>
+              <a:t>They can then go into the pull request, make suggested changes, or approve and merge the request. </a:t>
+            </a:r>
+          </a:p>
+          <a:p>
+            <a:r>
+              <a:rPr lang="en-US" dirty="0"/>
+              <a:t>Once merged, your updated code will be in the main branch of the repository. </a:t>
+            </a:r>
+          </a:p>
+          <a:p>
+            <a:r>
+              <a:rPr lang="en-US" dirty="0"/>
+              <a:t>You can now delete your branch. </a:t>
+            </a:r>
+          </a:p>
+          <a:p>
+            <a:pPr lvl="1"/>
+            <a:endParaRPr lang="en-US" dirty="0"/>
+          </a:p>
+          <a:p>
+            <a:pPr lvl="1"/>
+            <a:endParaRPr lang="en-US" dirty="0"/>
+          </a:p>
+        </p:txBody>
+      </p:sp>
+      <p:pic>
+        <p:nvPicPr>
+          <p:cNvPr id="5" name="Picture 4">
+            <a:extLst>
+              <a:ext uri="{FF2B5EF4-FFF2-40B4-BE49-F238E27FC236}">
+                <a16:creationId xmlns:a16="http://schemas.microsoft.com/office/drawing/2014/main" id="{6C6BCA40-0937-3F13-5620-9A0AD1B50240}"/>
+              </a:ext>
+            </a:extLst>
+          </p:cNvPr>
+          <p:cNvPicPr>
+            <a:picLocks noChangeAspect="1"/>
+          </p:cNvPicPr>
+          <p:nvPr/>
+        </p:nvPicPr>
+        <p:blipFill>
+          <a:blip r:embed="rId2"/>
+          <a:stretch>
+            <a:fillRect/>
+          </a:stretch>
+        </p:blipFill>
+        <p:spPr>
+          <a:xfrm>
+            <a:off x="6096000" y="976002"/>
+            <a:ext cx="5225539" cy="5396223"/>
+          </a:xfrm>
+          <a:prstGeom prst="rect">
+            <a:avLst/>
+          </a:prstGeom>
+        </p:spPr>
+      </p:pic>
+      <p:sp>
+        <p:nvSpPr>
+          <p:cNvPr id="6" name="Rectangle 5">
+            <a:extLst>
+              <a:ext uri="{FF2B5EF4-FFF2-40B4-BE49-F238E27FC236}">
+                <a16:creationId xmlns:a16="http://schemas.microsoft.com/office/drawing/2014/main" id="{91F0E778-8778-59E6-66F1-A6BEF39DF59F}"/>
+              </a:ext>
+            </a:extLst>
+          </p:cNvPr>
+          <p:cNvSpPr/>
+          <p:nvPr/>
+        </p:nvSpPr>
+        <p:spPr>
+          <a:xfrm>
+            <a:off x="6200775" y="2600325"/>
+            <a:ext cx="2419350" cy="723900"/>
+          </a:xfrm>
+          <a:prstGeom prst="rect">
+            <a:avLst/>
+          </a:prstGeom>
+          <a:noFill/>
+          <a:ln w="38100">
+            <a:solidFill>
+              <a:srgbClr val="00B050"/>
+            </a:solidFill>
+          </a:ln>
+        </p:spPr>
+        <p:style>
+          <a:lnRef idx="2">
+            <a:schemeClr val="accent1">
+              <a:shade val="15000"/>
+            </a:schemeClr>
+          </a:lnRef>
+          <a:fillRef idx="1">
+            <a:schemeClr val="accent1"/>
+          </a:fillRef>
+          <a:effectRef idx="0">
+            <a:schemeClr val="accent1"/>
+          </a:effectRef>
+          <a:fontRef idx="minor">
+            <a:schemeClr val="lt1"/>
+          </a:fontRef>
+        </p:style>
+        <p:txBody>
+          <a:bodyPr rtlCol="0" anchor="ctr"/>
+          <a:lstStyle/>
+          <a:p>
+            <a:pPr algn="ctr"/>
             <a:endParaRPr lang="en-US"/>
           </a:p>
         </p:txBody>
       </p:sp>
+      <p:cxnSp>
+        <p:nvCxnSpPr>
+          <p:cNvPr id="7" name="Straight Arrow Connector 6">
+            <a:extLst>
+              <a:ext uri="{FF2B5EF4-FFF2-40B4-BE49-F238E27FC236}">
+                <a16:creationId xmlns:a16="http://schemas.microsoft.com/office/drawing/2014/main" id="{BF2893C0-4044-7D4F-D140-FD53C4FC64E8}"/>
+              </a:ext>
+            </a:extLst>
+          </p:cNvPr>
+          <p:cNvCxnSpPr>
+            <a:cxnSpLocks/>
+          </p:cNvCxnSpPr>
+          <p:nvPr/>
+        </p:nvCxnSpPr>
+        <p:spPr>
+          <a:xfrm flipH="1">
+            <a:off x="3476625" y="2943225"/>
+            <a:ext cx="4314825" cy="2076450"/>
+          </a:xfrm>
+          <a:prstGeom prst="straightConnector1">
+            <a:avLst/>
+          </a:prstGeom>
+          <a:ln w="38100">
+            <a:solidFill>
+              <a:srgbClr val="00B050"/>
+            </a:solidFill>
+            <a:tailEnd type="triangle"/>
+          </a:ln>
+        </p:spPr>
+        <p:style>
+          <a:lnRef idx="1">
+            <a:schemeClr val="accent1"/>
+          </a:lnRef>
+          <a:fillRef idx="0">
+            <a:schemeClr val="accent1"/>
+          </a:fillRef>
+          <a:effectRef idx="0">
+            <a:schemeClr val="accent1"/>
+          </a:effectRef>
+          <a:fontRef idx="minor">
+            <a:schemeClr val="tx1"/>
+          </a:fontRef>
+        </p:style>
+      </p:cxnSp>
     </p:spTree>
     <p:extLst>
       <p:ext uri="{BB962C8B-B14F-4D97-AF65-F5344CB8AC3E}">
@@ -4999,7 +6366,13 @@
   <p:cSld>
     <p:spTree>
       <p:nvGrpSpPr>
-        <p:cNvPr id="1" name=""/>
+        <p:cNvPr id="1" name="">
+          <a:extLst>
+            <a:ext uri="{FF2B5EF4-FFF2-40B4-BE49-F238E27FC236}">
+              <a16:creationId xmlns:a16="http://schemas.microsoft.com/office/drawing/2014/main" id="{7C26297A-3635-EF52-3747-BEA6DBA37794}"/>
+            </a:ext>
+          </a:extLst>
+        </p:cNvPr>
         <p:cNvGrpSpPr/>
         <p:nvPr/>
       </p:nvGrpSpPr>
@@ -5016,7 +6389,7 @@
           <p:cNvPr id="2" name="Title 1">
             <a:extLst>
               <a:ext uri="{FF2B5EF4-FFF2-40B4-BE49-F238E27FC236}">
-                <a16:creationId xmlns:a16="http://schemas.microsoft.com/office/drawing/2014/main" id="{519FCEE8-A2EA-3B5F-6A2F-51B0FA5B30B2}"/>
+                <a16:creationId xmlns:a16="http://schemas.microsoft.com/office/drawing/2014/main" id="{615A50C0-FA6D-83B0-3C41-1DF0EC48433B}"/>
               </a:ext>
             </a:extLst>
           </p:cNvPr>
@@ -5034,7 +6407,7 @@
           <a:p>
             <a:r>
               <a:rPr lang="en-US" dirty="0"/>
-              <a:t>Version Control Introduction</a:t>
+              <a:t>DOI Talent Trainings</a:t>
             </a:r>
           </a:p>
         </p:txBody>
@@ -5044,7 +6417,7 @@
           <p:cNvPr id="3" name="Content Placeholder 2">
             <a:extLst>
               <a:ext uri="{FF2B5EF4-FFF2-40B4-BE49-F238E27FC236}">
-                <a16:creationId xmlns:a16="http://schemas.microsoft.com/office/drawing/2014/main" id="{6E085BBB-16B6-22A2-7ECA-89B918D12F00}"/>
+                <a16:creationId xmlns:a16="http://schemas.microsoft.com/office/drawing/2014/main" id="{F8E294DE-028C-A8E5-A57E-1F710375FB7E}"/>
               </a:ext>
             </a:extLst>
           </p:cNvPr>
@@ -5061,52 +6434,104 @@
           <a:lstStyle/>
           <a:p>
             <a:r>
+              <a:rPr lang="en-US" dirty="0"/>
+              <a:t>DGEC Introductory Training Write Role (GitHub) </a:t>
+            </a:r>
+            <a:r>
+              <a:rPr lang="en-US" sz="1800" u="sng" dirty="0">
+                <a:solidFill>
+                  <a:srgbClr val="242424"/>
+                </a:solidFill>
+                <a:effectLst/>
+                <a:latin typeface="Calibri" panose="020F0502020204030204" pitchFamily="34" charset="0"/>
+                <a:ea typeface="Times New Roman" panose="02020603050405020304" pitchFamily="18" charset="0"/>
+                <a:hlinkClick r:id="rId2" tooltip="https://doitalent.ibc.doi.gov/enrol/index.php?id=20144"/>
+              </a:rPr>
+              <a:t>https://doitalent.ibc.doi.gov/enrol/index.php?id=20144</a:t>
+            </a:r>
+            <a:endParaRPr lang="en-US" u="sng" dirty="0">
+              <a:solidFill>
+                <a:srgbClr val="242424"/>
+              </a:solidFill>
+              <a:latin typeface="Calibri" panose="020F0502020204030204" pitchFamily="34" charset="0"/>
+              <a:ea typeface="Times New Roman" panose="02020603050405020304" pitchFamily="18" charset="0"/>
+            </a:endParaRPr>
+          </a:p>
+          <a:p>
+            <a:r>
+              <a:rPr lang="en-US" dirty="0"/>
+              <a:t>Git &amp; GitHub: Working with Git Repositories (optional)</a:t>
+            </a:r>
+            <a:br>
+              <a:rPr lang="en-US" dirty="0"/>
+            </a:br>
+            <a:r>
               <a:rPr lang="en-US" dirty="0">
-                <a:hlinkClick r:id="rId2"/>
+                <a:hlinkClick r:id="rId3"/>
               </a:rPr>
-              <a:t>3 Session 3: Version Control with git and GitHub | Open Science Synthesis for the Delta Science Program: Week 1</a:t>
-            </a:r>
+              <a:t>https://doitalent.ibc.doi.gov/enrol/index.php?id=15058</a:t>
+            </a:r>
+            <a:r>
+              <a:rPr lang="en-US" dirty="0"/>
+              <a:t> </a:t>
+            </a:r>
+          </a:p>
+          <a:p>
+            <a:r>
+              <a:rPr lang="en-US" dirty="0"/>
+              <a:t>Once the first training is complete, you can request a license: </a:t>
+            </a:r>
+          </a:p>
+          <a:p>
+            <a:pPr lvl="1"/>
+            <a:r>
+              <a:rPr lang="en-US" dirty="0">
+                <a:solidFill>
+                  <a:srgbClr val="242424"/>
+                </a:solidFill>
+                <a:effectLst/>
+                <a:ea typeface="Times New Roman" panose="02020603050405020304" pitchFamily="18" charset="0"/>
+              </a:rPr>
+              <a:t>Request a license here: </a:t>
+            </a:r>
+            <a:r>
+              <a:rPr lang="en-US" u="sng" dirty="0">
+                <a:solidFill>
+                  <a:srgbClr val="242424"/>
+                </a:solidFill>
+                <a:effectLst/>
+                <a:ea typeface="Times New Roman" panose="02020603050405020304" pitchFamily="18" charset="0"/>
+                <a:hlinkClick r:id="rId4" tooltip="Original URL: https://apps.gov.powerapps.us/play/e/default-0693b5ba-4b18-4d7b-9341-f32f400a5494/a/36a8a424-404e-45e6-8577-0c886171a2ce?tenantId=0693b5ba-4b18-4d7b-9341-f32f400a5494. Click or tap if you trust this link."/>
+              </a:rPr>
+              <a:t>https://apps.gov.powerapps.us/play/e/default-0693b5ba-4b18-4d7b-9341-f32f400a5494/a/36a8a424-404e-45e6-8577-0c886171a2ce?tenantId=0693b5ba-4b18-4d7b-9341-f32f400a5494</a:t>
+            </a:r>
+            <a:r>
+              <a:rPr lang="en-US" dirty="0">
+                <a:solidFill>
+                  <a:srgbClr val="242424"/>
+                </a:solidFill>
+                <a:effectLst/>
+                <a:ea typeface="Times New Roman" panose="02020603050405020304" pitchFamily="18" charset="0"/>
+              </a:rPr>
+              <a:t> Please leave the license type as unknown.</a:t>
+            </a:r>
+            <a:endParaRPr lang="en-US" dirty="0">
+              <a:solidFill>
+                <a:srgbClr val="242424"/>
+              </a:solidFill>
+              <a:effectLst/>
+              <a:ea typeface="Aptos" panose="020B0004020202020204" pitchFamily="34" charset="0"/>
+            </a:endParaRPr>
+          </a:p>
+          <a:p>
             <a:endParaRPr lang="en-US" dirty="0"/>
-          </a:p>
-          <a:p>
-            <a:r>
-              <a:rPr lang="en-US" dirty="0"/>
-              <a:t>Useful basic tutorial above, benefits of version control</a:t>
-            </a:r>
-          </a:p>
-          <a:p>
-            <a:r>
-              <a:rPr lang="en-US" dirty="0"/>
-              <a:t>Software</a:t>
-            </a:r>
-          </a:p>
-          <a:p>
-            <a:pPr lvl="1"/>
-            <a:r>
-              <a:rPr lang="en-US" dirty="0"/>
-              <a:t>Git – version control software</a:t>
-            </a:r>
-          </a:p>
-          <a:p>
-            <a:pPr lvl="1"/>
-            <a:r>
-              <a:rPr lang="en-US" dirty="0"/>
-              <a:t>GitHub – online sharing </a:t>
-            </a:r>
-          </a:p>
-          <a:p>
-            <a:pPr lvl="1"/>
-            <a:r>
-              <a:rPr lang="en-US" dirty="0"/>
-              <a:t>R Studio – you can link Git to R and operate mainly through the R interface</a:t>
-            </a:r>
           </a:p>
         </p:txBody>
       </p:sp>
     </p:spTree>
     <p:extLst>
       <p:ext uri="{BB962C8B-B14F-4D97-AF65-F5344CB8AC3E}">
-        <p14:creationId xmlns:p14="http://schemas.microsoft.com/office/powerpoint/2010/main" val="1803670861"/>
+        <p14:creationId xmlns:p14="http://schemas.microsoft.com/office/powerpoint/2010/main" val="2572053775"/>
       </p:ext>
     </p:extLst>
   </p:cSld>
@@ -5138,7 +6563,7 @@
           <p:cNvPr id="2" name="Title 1">
             <a:extLst>
               <a:ext uri="{FF2B5EF4-FFF2-40B4-BE49-F238E27FC236}">
-                <a16:creationId xmlns:a16="http://schemas.microsoft.com/office/drawing/2014/main" id="{8405D3FC-F5C4-9BD1-77A7-587D775B5428}"/>
+                <a16:creationId xmlns:a16="http://schemas.microsoft.com/office/drawing/2014/main" id="{519FCEE8-A2EA-3B5F-6A2F-51B0FA5B30B2}"/>
               </a:ext>
             </a:extLst>
           </p:cNvPr>
@@ -5149,19 +6574,14 @@
             <p:ph type="title"/>
           </p:nvPr>
         </p:nvSpPr>
-        <p:spPr>
-          <a:xfrm>
-            <a:off x="1261872" y="365760"/>
-            <a:ext cx="9692640" cy="910779"/>
-          </a:xfrm>
-        </p:spPr>
+        <p:spPr/>
         <p:txBody>
           <a:bodyPr/>
           <a:lstStyle/>
           <a:p>
             <a:r>
               <a:rPr lang="en-US" dirty="0"/>
-              <a:t>General Order of Operations</a:t>
+              <a:t>Version Control Introduction</a:t>
             </a:r>
           </a:p>
         </p:txBody>
@@ -5171,7 +6591,7 @@
           <p:cNvPr id="3" name="Content Placeholder 2">
             <a:extLst>
               <a:ext uri="{FF2B5EF4-FFF2-40B4-BE49-F238E27FC236}">
-                <a16:creationId xmlns:a16="http://schemas.microsoft.com/office/drawing/2014/main" id="{9C4BC62C-3BB8-B873-E9C9-0756E36D8EAF}"/>
+                <a16:creationId xmlns:a16="http://schemas.microsoft.com/office/drawing/2014/main" id="{6E085BBB-16B6-22A2-7ECA-89B918D12F00}"/>
               </a:ext>
             </a:extLst>
           </p:cNvPr>
@@ -5182,202 +6602,79 @@
             <p:ph idx="1"/>
           </p:nvPr>
         </p:nvSpPr>
-        <p:spPr>
-          <a:xfrm>
-            <a:off x="1261872" y="1602462"/>
-            <a:ext cx="8595360" cy="4577675"/>
-          </a:xfrm>
-        </p:spPr>
-        <p:txBody>
-          <a:bodyPr>
-            <a:normAutofit fontScale="92500" lnSpcReduction="10000"/>
-          </a:bodyPr>
+        <p:spPr/>
+        <p:txBody>
+          <a:bodyPr/>
           <a:lstStyle/>
           <a:p>
-            <a:pPr marL="342900" indent="-342900">
-              <a:buFont typeface="+mj-lt"/>
-              <a:buAutoNum type="arabicPeriod"/>
-            </a:pPr>
-            <a:r>
-              <a:rPr lang="en-US" dirty="0"/>
-              <a:t>Create repository in GitHub (add readme, </a:t>
-            </a:r>
-            <a:r>
-              <a:rPr lang="en-US" dirty="0" err="1"/>
-              <a:t>gitignore</a:t>
-            </a:r>
-            <a:r>
-              <a:rPr lang="en-US" dirty="0"/>
-              <a:t> files)</a:t>
-            </a:r>
-          </a:p>
-          <a:p>
-            <a:pPr marL="617220" lvl="1" indent="-342900">
-              <a:buFont typeface="+mj-lt"/>
-              <a:buAutoNum type="arabicPeriod"/>
-            </a:pPr>
-            <a:r>
-              <a:rPr lang="en-US" dirty="0" err="1"/>
-              <a:t>gitignore</a:t>
-            </a:r>
-            <a:r>
-              <a:rPr lang="en-US" dirty="0"/>
-              <a:t> file: list of files Git will not track (e.g. large files, sensitive info)</a:t>
-            </a:r>
-          </a:p>
-          <a:p>
-            <a:pPr marL="342900" indent="-342900">
-              <a:buFont typeface="+mj-lt"/>
-              <a:buAutoNum type="arabicPeriod"/>
-            </a:pPr>
-            <a:r>
-              <a:rPr lang="en-US" dirty="0"/>
-              <a:t>Clone repository to R </a:t>
-            </a:r>
-          </a:p>
-          <a:p>
-            <a:pPr marL="617220" lvl="1" indent="-342900">
-              <a:buFont typeface="+mj-lt"/>
-              <a:buAutoNum type="arabicPeriod"/>
-            </a:pPr>
-            <a:r>
-              <a:rPr lang="en-US" dirty="0"/>
-              <a:t>Create new R project</a:t>
-            </a:r>
-          </a:p>
-          <a:p>
-            <a:pPr marL="617220" lvl="1" indent="-342900">
-              <a:buFont typeface="+mj-lt"/>
-              <a:buAutoNum type="arabicPeriod"/>
-            </a:pPr>
-            <a:r>
-              <a:rPr lang="en-US" dirty="0"/>
-              <a:t>Select version control, Git</a:t>
-            </a:r>
-          </a:p>
-          <a:p>
-            <a:pPr marL="617220" lvl="1" indent="-342900">
-              <a:buFont typeface="+mj-lt"/>
-              <a:buAutoNum type="arabicPeriod"/>
-            </a:pPr>
-            <a:r>
-              <a:rPr lang="en-US" dirty="0"/>
-              <a:t>Copy link from GitHub URL</a:t>
-            </a:r>
-          </a:p>
-          <a:p>
-            <a:pPr marL="617220" lvl="1" indent="-342900">
-              <a:buFont typeface="+mj-lt"/>
-              <a:buAutoNum type="arabicPeriod"/>
-            </a:pPr>
-            <a:r>
-              <a:rPr lang="en-US" dirty="0"/>
-              <a:t>Navigate to directory you’d like to store</a:t>
-            </a:r>
-          </a:p>
-          <a:p>
-            <a:pPr marL="891540" lvl="2" indent="-342900">
-              <a:buFont typeface="+mj-lt"/>
-              <a:buAutoNum type="arabicPeriod"/>
-            </a:pPr>
-            <a:r>
-              <a:rPr lang="en-US" dirty="0"/>
-              <a:t>Can be useful to have one folder for all your GitHub repositories</a:t>
-            </a:r>
-          </a:p>
-          <a:p>
-            <a:pPr marL="342900" indent="-342900">
-              <a:buFont typeface="+mj-lt"/>
-              <a:buAutoNum type="arabicPeriod"/>
-            </a:pPr>
-            <a:r>
-              <a:rPr lang="en-US" dirty="0"/>
-              <a:t>Make edits</a:t>
-            </a:r>
-          </a:p>
-          <a:p>
-            <a:pPr marL="342900" indent="-342900">
-              <a:buFont typeface="+mj-lt"/>
-              <a:buAutoNum type="arabicPeriod"/>
-            </a:pPr>
-            <a:r>
-              <a:rPr lang="en-US" dirty="0"/>
-              <a:t>Save edits</a:t>
-            </a:r>
-          </a:p>
-          <a:p>
-            <a:pPr marL="342900" indent="-342900">
-              <a:buFont typeface="+mj-lt"/>
-              <a:buAutoNum type="arabicPeriod"/>
-            </a:pPr>
-            <a:r>
-              <a:rPr lang="en-US" dirty="0"/>
-              <a:t>Before you commit files, look at the file size. Try not to commit anything &gt;15MB.</a:t>
-            </a:r>
-          </a:p>
-          <a:p>
-            <a:pPr marL="617220" lvl="1" indent="-342900">
-              <a:buFont typeface="+mj-lt"/>
-              <a:buAutoNum type="arabicPeriod"/>
-            </a:pPr>
-            <a:r>
-              <a:rPr lang="en-US" dirty="0"/>
-              <a:t>For large files, try saving as .</a:t>
-            </a:r>
-            <a:r>
-              <a:rPr lang="en-US" dirty="0" err="1"/>
-              <a:t>Rds</a:t>
-            </a:r>
-            <a:r>
-              <a:rPr lang="en-US" dirty="0"/>
-              <a:t> and compressing the file first (compress = “</a:t>
-            </a:r>
-            <a:r>
-              <a:rPr lang="en-US" dirty="0" err="1"/>
-              <a:t>xz</a:t>
-            </a:r>
-            <a:r>
-              <a:rPr lang="en-US" dirty="0"/>
-              <a:t>”) </a:t>
-            </a:r>
-          </a:p>
-          <a:p>
-            <a:pPr marL="342900" indent="-342900">
-              <a:buFont typeface="+mj-lt"/>
-              <a:buAutoNum type="arabicPeriod"/>
-            </a:pPr>
             <a:r>
               <a:rPr lang="en-US" dirty="0">
-                <a:solidFill>
-                  <a:schemeClr val="accent1"/>
-                </a:solidFill>
+                <a:hlinkClick r:id="rId2"/>
               </a:rPr>
-              <a:t>Commit – Pull – Push vs. Pull – Commit – Push</a:t>
-            </a:r>
-          </a:p>
-          <a:p>
-            <a:pPr marL="617220" lvl="1" indent="-342900">
-              <a:buFont typeface="+mj-lt"/>
-              <a:buAutoNum type="arabicPeriod"/>
-            </a:pPr>
-            <a:r>
-              <a:rPr lang="en-US" dirty="0"/>
-              <a:t>Write a useful commit message</a:t>
-            </a:r>
-          </a:p>
-          <a:p>
-            <a:pPr marL="342900" indent="-342900">
-              <a:buFont typeface="+mj-lt"/>
-              <a:buAutoNum type="arabicPeriod"/>
-            </a:pPr>
+              <a:t>3 Session 3: Version Control with git and GitHub | Open Science Synthesis for the Delta Science Program: Week 1</a:t>
+            </a:r>
             <a:endParaRPr lang="en-US" dirty="0"/>
+          </a:p>
+          <a:p>
+            <a:r>
+              <a:rPr lang="en-US" dirty="0"/>
+              <a:t>Useful basic tutorial above, benefits of version control</a:t>
+            </a:r>
+          </a:p>
+          <a:p>
+            <a:r>
+              <a:rPr lang="en-US" dirty="0"/>
+              <a:t>Software</a:t>
+            </a:r>
+          </a:p>
+          <a:p>
+            <a:pPr lvl="1"/>
+            <a:r>
+              <a:rPr lang="en-US" dirty="0"/>
+              <a:t>Git – version control software </a:t>
+            </a:r>
+            <a:r>
+              <a:rPr lang="en-US" dirty="0">
+                <a:hlinkClick r:id="rId3"/>
+              </a:rPr>
+              <a:t>Git - Downloads</a:t>
+            </a:r>
+            <a:endParaRPr lang="en-US" dirty="0"/>
+          </a:p>
+          <a:p>
+            <a:pPr lvl="1"/>
+            <a:r>
+              <a:rPr lang="en-US" dirty="0"/>
+              <a:t>GitHub – online sharing </a:t>
+            </a:r>
+          </a:p>
+          <a:p>
+            <a:pPr lvl="2"/>
+            <a:r>
+              <a:rPr lang="en-US" dirty="0"/>
+              <a:t>Create a username on GitHub </a:t>
+            </a:r>
+            <a:r>
+              <a:rPr lang="en-US" dirty="0" err="1">
+                <a:hlinkClick r:id="rId4"/>
+              </a:rPr>
+              <a:t>GitHub</a:t>
+            </a:r>
+            <a:endParaRPr lang="en-US" dirty="0"/>
+          </a:p>
+          <a:p>
+            <a:pPr lvl="1"/>
+            <a:r>
+              <a:rPr lang="en-US" dirty="0"/>
+              <a:t>R Studio – you can link Git to R and operate mainly through the R interface</a:t>
+            </a:r>
           </a:p>
         </p:txBody>
       </p:sp>
     </p:spTree>
     <p:extLst>
       <p:ext uri="{BB962C8B-B14F-4D97-AF65-F5344CB8AC3E}">
-        <p14:creationId xmlns:p14="http://schemas.microsoft.com/office/powerpoint/2010/main" val="2745742810"/>
+        <p14:creationId xmlns:p14="http://schemas.microsoft.com/office/powerpoint/2010/main" val="1803670861"/>
       </p:ext>
     </p:extLst>
   </p:cSld>
@@ -5409,7 +6706,7 @@
           <p:cNvPr id="2" name="Title 1">
             <a:extLst>
               <a:ext uri="{FF2B5EF4-FFF2-40B4-BE49-F238E27FC236}">
-                <a16:creationId xmlns:a16="http://schemas.microsoft.com/office/drawing/2014/main" id="{FC9B95DC-31DA-9B84-EDCF-E0D44E74BDE7}"/>
+                <a16:creationId xmlns:a16="http://schemas.microsoft.com/office/drawing/2014/main" id="{8405D3FC-F5C4-9BD1-77A7-587D775B5428}"/>
               </a:ext>
             </a:extLst>
           </p:cNvPr>
@@ -5422,8 +6719,8 @@
         </p:nvSpPr>
         <p:spPr>
           <a:xfrm>
-            <a:off x="1261872" y="758952"/>
-            <a:ext cx="9418320" cy="1691640"/>
+            <a:off x="1261872" y="365760"/>
+            <a:ext cx="9692640" cy="910779"/>
           </a:xfrm>
         </p:spPr>
         <p:txBody>
@@ -5432,17 +6729,17 @@
           <a:p>
             <a:r>
               <a:rPr lang="en-US" dirty="0"/>
-              <a:t>Collaboration</a:t>
-            </a:r>
-          </a:p>
-        </p:txBody>
-      </p:sp>
-      <p:sp>
-        <p:nvSpPr>
-          <p:cNvPr id="3" name="Text Placeholder 2">
+              <a:t>General Order of Operations</a:t>
+            </a:r>
+          </a:p>
+        </p:txBody>
+      </p:sp>
+      <p:sp>
+        <p:nvSpPr>
+          <p:cNvPr id="3" name="Content Placeholder 2">
             <a:extLst>
               <a:ext uri="{FF2B5EF4-FFF2-40B4-BE49-F238E27FC236}">
-                <a16:creationId xmlns:a16="http://schemas.microsoft.com/office/drawing/2014/main" id="{A7936E50-6E41-6E61-B14D-5B68C7D0A4EE}"/>
+                <a16:creationId xmlns:a16="http://schemas.microsoft.com/office/drawing/2014/main" id="{9C4BC62C-3BB8-B873-E9C9-0756E36D8EAF}"/>
               </a:ext>
             </a:extLst>
           </p:cNvPr>
@@ -5450,22 +6747,382 @@
             <a:spLocks noGrp="1"/>
           </p:cNvSpPr>
           <p:nvPr>
-            <p:ph type="body" idx="1"/>
-          </p:nvPr>
-        </p:nvSpPr>
-        <p:spPr/>
-        <p:txBody>
-          <a:bodyPr/>
+            <p:ph idx="1"/>
+          </p:nvPr>
+        </p:nvSpPr>
+        <p:spPr>
+          <a:xfrm>
+            <a:off x="337947" y="1434662"/>
+            <a:ext cx="8595360" cy="5147441"/>
+          </a:xfrm>
+        </p:spPr>
+        <p:txBody>
+          <a:bodyPr>
+            <a:normAutofit fontScale="85000" lnSpcReduction="20000"/>
+          </a:bodyPr>
           <a:lstStyle/>
           <a:p>
+            <a:pPr marL="342900" indent="-342900">
+              <a:buFont typeface="+mj-lt"/>
+              <a:buAutoNum type="arabicPeriod"/>
+            </a:pPr>
+            <a:r>
+              <a:rPr lang="en-US" dirty="0"/>
+              <a:t>Create repository in GitHub (add readme, </a:t>
+            </a:r>
+            <a:r>
+              <a:rPr lang="en-US" dirty="0" err="1"/>
+              <a:t>gitignore</a:t>
+            </a:r>
+            <a:r>
+              <a:rPr lang="en-US" dirty="0"/>
+              <a:t> files)</a:t>
+            </a:r>
+          </a:p>
+          <a:p>
+            <a:pPr marL="617220" lvl="1" indent="-342900">
+              <a:buFont typeface="+mj-lt"/>
+              <a:buAutoNum type="arabicPeriod"/>
+            </a:pPr>
+            <a:r>
+              <a:rPr lang="en-US" dirty="0"/>
+              <a:t>readme: include descriptions of files, how to use the repository, other useful info for external users</a:t>
+            </a:r>
+          </a:p>
+          <a:p>
+            <a:pPr marL="617220" lvl="1" indent="-342900">
+              <a:buFont typeface="+mj-lt"/>
+              <a:buAutoNum type="arabicPeriod"/>
+            </a:pPr>
+            <a:r>
+              <a:rPr lang="en-US" dirty="0" err="1"/>
+              <a:t>gitignore</a:t>
+            </a:r>
+            <a:r>
+              <a:rPr lang="en-US" dirty="0"/>
+              <a:t> file: list of files Git will not track (e.g. large files, sensitive info, items you are testing)</a:t>
+            </a:r>
+          </a:p>
+          <a:p>
+            <a:pPr marL="342900" indent="-342900">
+              <a:buFont typeface="+mj-lt"/>
+              <a:buAutoNum type="arabicPeriod"/>
+            </a:pPr>
+            <a:r>
+              <a:rPr lang="en-US" dirty="0"/>
+              <a:t>Clone repository to R </a:t>
+            </a:r>
+          </a:p>
+          <a:p>
+            <a:pPr marL="617220" lvl="1" indent="-342900">
+              <a:buFont typeface="+mj-lt"/>
+              <a:buAutoNum type="arabicPeriod"/>
+            </a:pPr>
+            <a:r>
+              <a:rPr lang="en-US" dirty="0"/>
+              <a:t>Create new R project</a:t>
+            </a:r>
+          </a:p>
+          <a:p>
+            <a:pPr marL="617220" lvl="1" indent="-342900">
+              <a:buFont typeface="+mj-lt"/>
+              <a:buAutoNum type="arabicPeriod"/>
+            </a:pPr>
+            <a:r>
+              <a:rPr lang="en-US" dirty="0"/>
+              <a:t>Select version control, Git</a:t>
+            </a:r>
+          </a:p>
+          <a:p>
+            <a:pPr marL="617220" lvl="1" indent="-342900">
+              <a:buFont typeface="+mj-lt"/>
+              <a:buAutoNum type="arabicPeriod"/>
+            </a:pPr>
+            <a:r>
+              <a:rPr lang="en-US" dirty="0"/>
+              <a:t>Copy link from GitHub URL</a:t>
+            </a:r>
+          </a:p>
+          <a:p>
+            <a:pPr marL="617220" lvl="1" indent="-342900">
+              <a:buFont typeface="+mj-lt"/>
+              <a:buAutoNum type="arabicPeriod"/>
+            </a:pPr>
+            <a:r>
+              <a:rPr lang="en-US" dirty="0"/>
+              <a:t>Navigate to directory you’d like to store</a:t>
+            </a:r>
+          </a:p>
+          <a:p>
+            <a:pPr marL="891540" lvl="2" indent="-342900">
+              <a:buFont typeface="+mj-lt"/>
+              <a:buAutoNum type="arabicPeriod"/>
+            </a:pPr>
+            <a:r>
+              <a:rPr lang="en-US" dirty="0"/>
+              <a:t>Can be useful to have one folder for all your GitHub repositories</a:t>
+            </a:r>
+          </a:p>
+          <a:p>
+            <a:pPr marL="342900" indent="-342900">
+              <a:buFont typeface="+mj-lt"/>
+              <a:buAutoNum type="arabicPeriod"/>
+            </a:pPr>
+            <a:r>
+              <a:rPr lang="en-US" dirty="0"/>
+              <a:t>Make edits to your file</a:t>
+            </a:r>
+          </a:p>
+          <a:p>
+            <a:pPr marL="342900" indent="-342900">
+              <a:buFont typeface="+mj-lt"/>
+              <a:buAutoNum type="arabicPeriod"/>
+            </a:pPr>
+            <a:r>
+              <a:rPr lang="en-US" dirty="0"/>
+              <a:t>Save edits</a:t>
+            </a:r>
+          </a:p>
+          <a:p>
+            <a:pPr marL="342900" indent="-342900">
+              <a:buFont typeface="+mj-lt"/>
+              <a:buAutoNum type="arabicPeriod"/>
+            </a:pPr>
+            <a:r>
+              <a:rPr lang="en-US" dirty="0"/>
+              <a:t>Before you commit files, look at the file size. Try not to commit anything &gt;15MB.</a:t>
+            </a:r>
+          </a:p>
+          <a:p>
+            <a:pPr marL="617220" lvl="1" indent="-342900">
+              <a:buFont typeface="+mj-lt"/>
+              <a:buAutoNum type="arabicPeriod"/>
+            </a:pPr>
+            <a:r>
+              <a:rPr lang="en-US" dirty="0"/>
+              <a:t>For large files, try saving as .</a:t>
+            </a:r>
+            <a:r>
+              <a:rPr lang="en-US" dirty="0" err="1"/>
+              <a:t>Rds</a:t>
+            </a:r>
+            <a:r>
+              <a:rPr lang="en-US" dirty="0"/>
+              <a:t> and compressing the file first (compress = “</a:t>
+            </a:r>
+            <a:r>
+              <a:rPr lang="en-US" dirty="0" err="1"/>
+              <a:t>xz</a:t>
+            </a:r>
+            <a:r>
+              <a:rPr lang="en-US" dirty="0"/>
+              <a:t>”) </a:t>
+            </a:r>
+          </a:p>
+          <a:p>
+            <a:pPr marL="617220" lvl="1" indent="-342900">
+              <a:buFont typeface="+mj-lt"/>
+              <a:buAutoNum type="arabicPeriod"/>
+            </a:pPr>
+            <a:r>
+              <a:rPr lang="en-US" dirty="0"/>
+              <a:t>Add to .</a:t>
+            </a:r>
+            <a:r>
+              <a:rPr lang="en-US" dirty="0" err="1"/>
+              <a:t>gitignore</a:t>
+            </a:r>
+            <a:r>
+              <a:rPr lang="en-US" dirty="0"/>
+              <a:t> if you think you may accidentally try to commit the file</a:t>
+            </a:r>
+          </a:p>
+          <a:p>
+            <a:pPr marL="342900" indent="-342900">
+              <a:buFont typeface="+mj-lt"/>
+              <a:buAutoNum type="arabicPeriod"/>
+            </a:pPr>
+            <a:r>
+              <a:rPr lang="en-US" dirty="0">
+                <a:solidFill>
+                  <a:schemeClr val="accent1"/>
+                </a:solidFill>
+              </a:rPr>
+              <a:t>Pull – Commit – Push</a:t>
+            </a:r>
+          </a:p>
+          <a:p>
+            <a:pPr marL="617220" lvl="1" indent="-342900">
+              <a:buFont typeface="+mj-lt"/>
+              <a:buAutoNum type="arabicPeriod"/>
+            </a:pPr>
+            <a:r>
+              <a:rPr lang="en-US" dirty="0"/>
+              <a:t>Pulling will bring in edits from collaborators. Resolve any conflicts after you pull if necessary.</a:t>
+            </a:r>
+          </a:p>
+          <a:p>
+            <a:pPr marL="617220" lvl="1" indent="-342900">
+              <a:buFont typeface="+mj-lt"/>
+              <a:buAutoNum type="arabicPeriod"/>
+            </a:pPr>
+            <a:r>
+              <a:rPr lang="en-US" dirty="0"/>
+              <a:t>Write a useful commit message describing what you did as you may come back to this version in the future</a:t>
+            </a:r>
+          </a:p>
+          <a:p>
+            <a:pPr marL="617220" lvl="1" indent="-342900">
+              <a:buFont typeface="+mj-lt"/>
+              <a:buAutoNum type="arabicPeriod"/>
+            </a:pPr>
+            <a:r>
+              <a:rPr lang="en-US" dirty="0"/>
+              <a:t>Pushing will put your edits onto GitHub</a:t>
+            </a:r>
+          </a:p>
+          <a:p>
+            <a:pPr marL="342900" indent="-342900">
+              <a:buFont typeface="+mj-lt"/>
+              <a:buAutoNum type="arabicPeriod"/>
+            </a:pPr>
             <a:endParaRPr lang="en-US" dirty="0"/>
           </a:p>
         </p:txBody>
       </p:sp>
+      <p:pic>
+        <p:nvPicPr>
+          <p:cNvPr id="5" name="Picture 4">
+            <a:extLst>
+              <a:ext uri="{FF2B5EF4-FFF2-40B4-BE49-F238E27FC236}">
+                <a16:creationId xmlns:a16="http://schemas.microsoft.com/office/drawing/2014/main" id="{4DA619A3-2A04-CA1F-397A-A41B7997C950}"/>
+              </a:ext>
+            </a:extLst>
+          </p:cNvPr>
+          <p:cNvPicPr>
+            <a:picLocks noChangeAspect="1"/>
+          </p:cNvPicPr>
+          <p:nvPr/>
+        </p:nvPicPr>
+        <p:blipFill>
+          <a:blip r:embed="rId2"/>
+          <a:stretch>
+            <a:fillRect/>
+          </a:stretch>
+        </p:blipFill>
+        <p:spPr>
+          <a:xfrm>
+            <a:off x="6096000" y="2627411"/>
+            <a:ext cx="5121836" cy="1869877"/>
+          </a:xfrm>
+          <a:prstGeom prst="rect">
+            <a:avLst/>
+          </a:prstGeom>
+        </p:spPr>
+      </p:pic>
+      <p:sp>
+        <p:nvSpPr>
+          <p:cNvPr id="6" name="Rectangle 5">
+            <a:extLst>
+              <a:ext uri="{FF2B5EF4-FFF2-40B4-BE49-F238E27FC236}">
+                <a16:creationId xmlns:a16="http://schemas.microsoft.com/office/drawing/2014/main" id="{699A5C1A-8278-E118-775B-8D9A793FE8A1}"/>
+              </a:ext>
+            </a:extLst>
+          </p:cNvPr>
+          <p:cNvSpPr/>
+          <p:nvPr/>
+        </p:nvSpPr>
+        <p:spPr>
+          <a:xfrm>
+            <a:off x="9010650" y="3810000"/>
+            <a:ext cx="2114550" cy="514350"/>
+          </a:xfrm>
+          <a:prstGeom prst="rect">
+            <a:avLst/>
+          </a:prstGeom>
+          <a:noFill/>
+          <a:ln w="38100">
+            <a:solidFill>
+              <a:srgbClr val="00B050"/>
+            </a:solidFill>
+          </a:ln>
+        </p:spPr>
+        <p:style>
+          <a:lnRef idx="2">
+            <a:schemeClr val="accent1">
+              <a:shade val="15000"/>
+            </a:schemeClr>
+          </a:lnRef>
+          <a:fillRef idx="1">
+            <a:schemeClr val="accent1"/>
+          </a:fillRef>
+          <a:effectRef idx="0">
+            <a:schemeClr val="accent1"/>
+          </a:effectRef>
+          <a:fontRef idx="minor">
+            <a:schemeClr val="lt1"/>
+          </a:fontRef>
+        </p:style>
+        <p:txBody>
+          <a:bodyPr rtlCol="0" anchor="ctr"/>
+          <a:lstStyle/>
+          <a:p>
+            <a:pPr algn="ctr"/>
+            <a:endParaRPr lang="en-US"/>
+          </a:p>
+        </p:txBody>
+      </p:sp>
+      <p:cxnSp>
+        <p:nvCxnSpPr>
+          <p:cNvPr id="8" name="Straight Arrow Connector 7">
+            <a:extLst>
+              <a:ext uri="{FF2B5EF4-FFF2-40B4-BE49-F238E27FC236}">
+                <a16:creationId xmlns:a16="http://schemas.microsoft.com/office/drawing/2014/main" id="{DFADC195-1214-EDCE-27B4-8005062EB799}"/>
+              </a:ext>
+            </a:extLst>
+          </p:cNvPr>
+          <p:cNvCxnSpPr>
+            <a:cxnSpLocks/>
+          </p:cNvCxnSpPr>
+          <p:nvPr/>
+        </p:nvCxnSpPr>
+        <p:spPr>
+          <a:xfrm flipH="1" flipV="1">
+            <a:off x="3181351" y="3048000"/>
+            <a:ext cx="5829299" cy="1208690"/>
+          </a:xfrm>
+          <a:prstGeom prst="straightConnector1">
+            <a:avLst/>
+          </a:prstGeom>
+          <a:ln w="19050" cap="flat" cmpd="sng" algn="ctr">
+            <a:solidFill>
+              <a:srgbClr val="00B050"/>
+            </a:solidFill>
+            <a:prstDash val="solid"/>
+            <a:round/>
+            <a:headEnd type="none" w="med" len="med"/>
+            <a:tailEnd type="arrow" w="med" len="med"/>
+          </a:ln>
+        </p:spPr>
+        <p:style>
+          <a:lnRef idx="0">
+            <a:scrgbClr r="0" g="0" b="0"/>
+          </a:lnRef>
+          <a:fillRef idx="0">
+            <a:scrgbClr r="0" g="0" b="0"/>
+          </a:fillRef>
+          <a:effectRef idx="0">
+            <a:scrgbClr r="0" g="0" b="0"/>
+          </a:effectRef>
+          <a:fontRef idx="minor">
+            <a:schemeClr val="tx1"/>
+          </a:fontRef>
+        </p:style>
+      </p:cxnSp>
     </p:spTree>
     <p:extLst>
       <p:ext uri="{BB962C8B-B14F-4D97-AF65-F5344CB8AC3E}">
-        <p14:creationId xmlns:p14="http://schemas.microsoft.com/office/powerpoint/2010/main" val="1302369842"/>
+        <p14:creationId xmlns:p14="http://schemas.microsoft.com/office/powerpoint/2010/main" val="2745742810"/>
       </p:ext>
     </p:extLst>
   </p:cSld>
@@ -5497,7 +7154,7 @@
           <p:cNvPr id="2" name="Title 1">
             <a:extLst>
               <a:ext uri="{FF2B5EF4-FFF2-40B4-BE49-F238E27FC236}">
-                <a16:creationId xmlns:a16="http://schemas.microsoft.com/office/drawing/2014/main" id="{E7C4FA67-212C-CC7C-193B-345CC25710CC}"/>
+                <a16:creationId xmlns:a16="http://schemas.microsoft.com/office/drawing/2014/main" id="{7A053407-CDF0-B093-06DD-99432F9842E1}"/>
               </a:ext>
             </a:extLst>
           </p:cNvPr>
@@ -5508,14 +7165,19 @@
             <p:ph type="title"/>
           </p:nvPr>
         </p:nvSpPr>
-        <p:spPr/>
+        <p:spPr>
+          <a:xfrm>
+            <a:off x="327083" y="153140"/>
+            <a:ext cx="9692640" cy="1325562"/>
+          </a:xfrm>
+        </p:spPr>
         <p:txBody>
           <a:bodyPr/>
           <a:lstStyle/>
           <a:p>
             <a:r>
               <a:rPr lang="en-US" dirty="0"/>
-              <a:t>Ways to collaborate</a:t>
+              <a:t>Project Organization</a:t>
             </a:r>
           </a:p>
         </p:txBody>
@@ -5525,7 +7187,7 @@
           <p:cNvPr id="3" name="Content Placeholder 2">
             <a:extLst>
               <a:ext uri="{FF2B5EF4-FFF2-40B4-BE49-F238E27FC236}">
-                <a16:creationId xmlns:a16="http://schemas.microsoft.com/office/drawing/2014/main" id="{91C7D7A3-E841-3368-7D75-F2B83A1BC6DF}"/>
+                <a16:creationId xmlns:a16="http://schemas.microsoft.com/office/drawing/2014/main" id="{73066FAE-4D55-7E58-782A-4A98F694D101}"/>
               </a:ext>
             </a:extLst>
           </p:cNvPr>
@@ -5538,52 +7200,512 @@
         </p:nvSpPr>
         <p:spPr>
           <a:xfrm>
-            <a:off x="1261872" y="1828801"/>
-            <a:ext cx="8595360" cy="1792586"/>
+            <a:off x="327083" y="2004848"/>
+            <a:ext cx="3653710" cy="2877209"/>
           </a:xfrm>
         </p:spPr>
         <p:txBody>
-          <a:bodyPr/>
+          <a:bodyPr>
+            <a:normAutofit fontScale="92500" lnSpcReduction="20000"/>
+          </a:bodyPr>
           <a:lstStyle/>
           <a:p>
-            <a:r>
-              <a:rPr lang="en-US" dirty="0"/>
-              <a:t>If multiple people are working on the same files, issues may arise. </a:t>
-            </a:r>
-          </a:p>
-          <a:p>
-            <a:r>
-              <a:rPr lang="en-US" dirty="0"/>
-              <a:t>A few ways to reduce issues:</a:t>
+            <a:pPr marL="0" indent="0">
+              <a:buNone/>
+            </a:pPr>
+            <a:r>
+              <a:rPr lang="en-US" b="1" dirty="0"/>
+              <a:t>Organization</a:t>
+            </a:r>
+          </a:p>
+          <a:p>
+            <a:r>
+              <a:rPr lang="en-US" dirty="0" err="1"/>
+              <a:t>Project_folder</a:t>
+            </a:r>
+            <a:r>
+              <a:rPr lang="en-US" dirty="0"/>
+              <a:t>/</a:t>
             </a:r>
           </a:p>
           <a:p>
             <a:pPr lvl="1"/>
             <a:r>
               <a:rPr lang="en-US" dirty="0"/>
-              <a:t>Stay in constant communication when you are making edits to a specific file</a:t>
+              <a:t>data/</a:t>
+            </a:r>
+          </a:p>
+          <a:p>
+            <a:pPr lvl="2"/>
+            <a:r>
+              <a:rPr lang="en-US" dirty="0" err="1"/>
+              <a:t>data_raw</a:t>
+            </a:r>
+            <a:r>
+              <a:rPr lang="en-US" dirty="0"/>
+              <a:t>/ (original data)</a:t>
+            </a:r>
+          </a:p>
+          <a:p>
+            <a:pPr lvl="2"/>
+            <a:r>
+              <a:rPr lang="en-US" dirty="0" err="1"/>
+              <a:t>data_processed</a:t>
+            </a:r>
+            <a:r>
+              <a:rPr lang="en-US" dirty="0"/>
+              <a:t> (cleaned up data)</a:t>
             </a:r>
           </a:p>
           <a:p>
             <a:pPr lvl="1"/>
             <a:r>
               <a:rPr lang="en-US" dirty="0"/>
-              <a:t>Use branches to work on different versions of the file</a:t>
-            </a:r>
+              <a:t>docs/ (documentation</a:t>
+            </a:r>
+            <a:r>
+              <a:rPr lang="en-US"/>
+              <a:t>, protocols, notes)</a:t>
+            </a:r>
+            <a:endParaRPr lang="en-US" dirty="0"/>
           </a:p>
           <a:p>
             <a:pPr lvl="1"/>
             <a:r>
               <a:rPr lang="en-US" dirty="0"/>
-              <a:t>Use pull requests </a:t>
-            </a:r>
-          </a:p>
-        </p:txBody>
-      </p:sp>
+              <a:t>scripts/ </a:t>
+            </a:r>
+          </a:p>
+          <a:p>
+            <a:pPr lvl="1"/>
+            <a:r>
+              <a:rPr lang="en-US" dirty="0"/>
+              <a:t>output/</a:t>
+            </a:r>
+          </a:p>
+          <a:p>
+            <a:pPr lvl="2"/>
+            <a:r>
+              <a:rPr lang="en-US" dirty="0"/>
+              <a:t>figures/ or plots/</a:t>
+            </a:r>
+          </a:p>
+          <a:p>
+            <a:pPr lvl="2"/>
+            <a:r>
+              <a:rPr lang="en-US" dirty="0"/>
+              <a:t>tables/</a:t>
+            </a:r>
+          </a:p>
+          <a:p>
+            <a:pPr lvl="1"/>
+            <a:endParaRPr lang="en-US" dirty="0"/>
+          </a:p>
+        </p:txBody>
+      </p:sp>
+      <p:sp>
+        <p:nvSpPr>
+          <p:cNvPr id="4" name="Content Placeholder 2">
+            <a:extLst>
+              <a:ext uri="{FF2B5EF4-FFF2-40B4-BE49-F238E27FC236}">
+                <a16:creationId xmlns:a16="http://schemas.microsoft.com/office/drawing/2014/main" id="{1B4519D8-AA3B-F7B1-BD94-4EF93AA0AE4C}"/>
+              </a:ext>
+            </a:extLst>
+          </p:cNvPr>
+          <p:cNvSpPr txBox="1">
+            <a:spLocks/>
+          </p:cNvSpPr>
+          <p:nvPr/>
+        </p:nvSpPr>
+        <p:spPr>
+          <a:xfrm>
+            <a:off x="3980793" y="2279431"/>
+            <a:ext cx="3555124" cy="2877208"/>
+          </a:xfrm>
+          <a:prstGeom prst="rect">
+            <a:avLst/>
+          </a:prstGeom>
+        </p:spPr>
+        <p:txBody>
+          <a:bodyPr vert="horz" lIns="91440" tIns="45720" rIns="91440" bIns="45720" rtlCol="0">
+            <a:normAutofit fontScale="92500" lnSpcReduction="10000"/>
+          </a:bodyPr>
+          <a:lstStyle>
+            <a:lvl1pPr marL="182880" indent="-182880" algn="l" defTabSz="914400" rtl="0" eaLnBrk="1" latinLnBrk="0" hangingPunct="1">
+              <a:lnSpc>
+                <a:spcPct val="95000"/>
+              </a:lnSpc>
+              <a:spcBef>
+                <a:spcPts val="1400"/>
+              </a:spcBef>
+              <a:spcAft>
+                <a:spcPts val="200"/>
+              </a:spcAft>
+              <a:buClr>
+                <a:schemeClr val="accent1"/>
+              </a:buClr>
+              <a:buSzPct val="80000"/>
+              <a:buFont typeface="Arial" pitchFamily="34" charset="0"/>
+              <a:buChar char="•"/>
+              <a:defRPr sz="1800" kern="1200" spc="10" baseline="0">
+                <a:solidFill>
+                  <a:schemeClr val="tx1"/>
+                </a:solidFill>
+                <a:latin typeface="Segoe UI" panose="020B0502040204020203" pitchFamily="34" charset="0"/>
+                <a:ea typeface="+mn-ea"/>
+                <a:cs typeface="Segoe UI" panose="020B0502040204020203" pitchFamily="34" charset="0"/>
+              </a:defRPr>
+            </a:lvl1pPr>
+            <a:lvl2pPr marL="457200" indent="-182880" algn="l" defTabSz="914400" rtl="0" eaLnBrk="1" latinLnBrk="0" hangingPunct="1">
+              <a:lnSpc>
+                <a:spcPct val="90000"/>
+              </a:lnSpc>
+              <a:spcBef>
+                <a:spcPts val="300"/>
+              </a:spcBef>
+              <a:spcAft>
+                <a:spcPts val="300"/>
+              </a:spcAft>
+              <a:buClr>
+                <a:schemeClr val="accent1"/>
+              </a:buClr>
+              <a:buFont typeface="Wingdings 2" pitchFamily="18" charset="2"/>
+              <a:buChar char=""/>
+              <a:defRPr sz="1600" kern="1200">
+                <a:solidFill>
+                  <a:schemeClr val="tx1">
+                    <a:lumMod val="85000"/>
+                    <a:lumOff val="15000"/>
+                  </a:schemeClr>
+                </a:solidFill>
+                <a:latin typeface="Segoe UI" panose="020B0502040204020203" pitchFamily="34" charset="0"/>
+                <a:ea typeface="+mn-ea"/>
+                <a:cs typeface="Segoe UI" panose="020B0502040204020203" pitchFamily="34" charset="0"/>
+              </a:defRPr>
+            </a:lvl2pPr>
+            <a:lvl3pPr marL="731520" indent="-182880" algn="l" defTabSz="914400" rtl="0" eaLnBrk="1" latinLnBrk="0" hangingPunct="1">
+              <a:lnSpc>
+                <a:spcPct val="90000"/>
+              </a:lnSpc>
+              <a:spcBef>
+                <a:spcPts val="300"/>
+              </a:spcBef>
+              <a:spcAft>
+                <a:spcPts val="300"/>
+              </a:spcAft>
+              <a:buClr>
+                <a:schemeClr val="accent1"/>
+              </a:buClr>
+              <a:buFont typeface="Wingdings 2" pitchFamily="18" charset="2"/>
+              <a:buChar char=""/>
+              <a:defRPr sz="1400" kern="1200">
+                <a:solidFill>
+                  <a:schemeClr val="tx1">
+                    <a:lumMod val="85000"/>
+                    <a:lumOff val="15000"/>
+                  </a:schemeClr>
+                </a:solidFill>
+                <a:latin typeface="Segoe UI" panose="020B0502040204020203" pitchFamily="34" charset="0"/>
+                <a:ea typeface="+mn-ea"/>
+                <a:cs typeface="Segoe UI" panose="020B0502040204020203" pitchFamily="34" charset="0"/>
+              </a:defRPr>
+            </a:lvl3pPr>
+            <a:lvl4pPr marL="1005840" indent="-182880" algn="l" defTabSz="914400" rtl="0" eaLnBrk="1" latinLnBrk="0" hangingPunct="1">
+              <a:lnSpc>
+                <a:spcPct val="90000"/>
+              </a:lnSpc>
+              <a:spcBef>
+                <a:spcPts val="300"/>
+              </a:spcBef>
+              <a:spcAft>
+                <a:spcPts val="300"/>
+              </a:spcAft>
+              <a:buClr>
+                <a:schemeClr val="accent1"/>
+              </a:buClr>
+              <a:buFont typeface="Wingdings 2" pitchFamily="18" charset="2"/>
+              <a:buChar char=""/>
+              <a:defRPr sz="1400" kern="1200">
+                <a:solidFill>
+                  <a:schemeClr val="tx1">
+                    <a:lumMod val="85000"/>
+                    <a:lumOff val="15000"/>
+                  </a:schemeClr>
+                </a:solidFill>
+                <a:latin typeface="Segoe UI" panose="020B0502040204020203" pitchFamily="34" charset="0"/>
+                <a:ea typeface="+mn-ea"/>
+                <a:cs typeface="Segoe UI" panose="020B0502040204020203" pitchFamily="34" charset="0"/>
+              </a:defRPr>
+            </a:lvl4pPr>
+            <a:lvl5pPr marL="1280160" indent="-182880" algn="l" defTabSz="914400" rtl="0" eaLnBrk="1" latinLnBrk="0" hangingPunct="1">
+              <a:lnSpc>
+                <a:spcPct val="90000"/>
+              </a:lnSpc>
+              <a:spcBef>
+                <a:spcPts val="300"/>
+              </a:spcBef>
+              <a:spcAft>
+                <a:spcPts val="300"/>
+              </a:spcAft>
+              <a:buClr>
+                <a:schemeClr val="accent1"/>
+              </a:buClr>
+              <a:buFont typeface="Wingdings 2" pitchFamily="18" charset="2"/>
+              <a:buChar char=""/>
+              <a:defRPr sz="1400" kern="1200">
+                <a:solidFill>
+                  <a:schemeClr val="tx1">
+                    <a:lumMod val="85000"/>
+                    <a:lumOff val="15000"/>
+                  </a:schemeClr>
+                </a:solidFill>
+                <a:latin typeface="Segoe UI" panose="020B0502040204020203" pitchFamily="34" charset="0"/>
+                <a:ea typeface="+mn-ea"/>
+                <a:cs typeface="Segoe UI" panose="020B0502040204020203" pitchFamily="34" charset="0"/>
+              </a:defRPr>
+            </a:lvl5pPr>
+            <a:lvl6pPr marL="1600000" indent="-228600" algn="l" defTabSz="914400" rtl="0" eaLnBrk="1" latinLnBrk="0" hangingPunct="1">
+              <a:lnSpc>
+                <a:spcPct val="90000"/>
+              </a:lnSpc>
+              <a:spcBef>
+                <a:spcPts val="300"/>
+              </a:spcBef>
+              <a:spcAft>
+                <a:spcPts val="300"/>
+              </a:spcAft>
+              <a:buClr>
+                <a:schemeClr val="accent1"/>
+              </a:buClr>
+              <a:buFont typeface="Wingdings 2" pitchFamily="18" charset="2"/>
+              <a:buChar char=""/>
+              <a:defRPr sz="1400" kern="1200">
+                <a:solidFill>
+                  <a:schemeClr val="tx1">
+                    <a:lumMod val="85000"/>
+                    <a:lumOff val="15000"/>
+                  </a:schemeClr>
+                </a:solidFill>
+                <a:latin typeface="+mn-lt"/>
+                <a:ea typeface="+mn-ea"/>
+                <a:cs typeface="+mn-cs"/>
+              </a:defRPr>
+            </a:lvl6pPr>
+            <a:lvl7pPr marL="1900000" indent="-228600" algn="l" defTabSz="914400" rtl="0" eaLnBrk="1" latinLnBrk="0" hangingPunct="1">
+              <a:lnSpc>
+                <a:spcPct val="90000"/>
+              </a:lnSpc>
+              <a:spcBef>
+                <a:spcPts val="300"/>
+              </a:spcBef>
+              <a:spcAft>
+                <a:spcPts val="300"/>
+              </a:spcAft>
+              <a:buClr>
+                <a:schemeClr val="accent1"/>
+              </a:buClr>
+              <a:buFont typeface="Wingdings 2" pitchFamily="18" charset="2"/>
+              <a:buChar char=""/>
+              <a:defRPr sz="1400" kern="1200">
+                <a:solidFill>
+                  <a:schemeClr val="tx1">
+                    <a:lumMod val="85000"/>
+                    <a:lumOff val="15000"/>
+                  </a:schemeClr>
+                </a:solidFill>
+                <a:latin typeface="+mn-lt"/>
+                <a:ea typeface="+mn-ea"/>
+                <a:cs typeface="+mn-cs"/>
+              </a:defRPr>
+            </a:lvl7pPr>
+            <a:lvl8pPr marL="2200000" indent="-228600" algn="l" defTabSz="914400" rtl="0" eaLnBrk="1" latinLnBrk="0" hangingPunct="1">
+              <a:lnSpc>
+                <a:spcPct val="90000"/>
+              </a:lnSpc>
+              <a:spcBef>
+                <a:spcPts val="300"/>
+              </a:spcBef>
+              <a:spcAft>
+                <a:spcPts val="300"/>
+              </a:spcAft>
+              <a:buClr>
+                <a:schemeClr val="accent1"/>
+              </a:buClr>
+              <a:buFont typeface="Wingdings 2" pitchFamily="18" charset="2"/>
+              <a:buChar char=""/>
+              <a:defRPr sz="1400" kern="1200">
+                <a:solidFill>
+                  <a:schemeClr val="tx1">
+                    <a:lumMod val="85000"/>
+                    <a:lumOff val="15000"/>
+                  </a:schemeClr>
+                </a:solidFill>
+                <a:latin typeface="+mn-lt"/>
+                <a:ea typeface="+mn-ea"/>
+                <a:cs typeface="+mn-cs"/>
+              </a:defRPr>
+            </a:lvl8pPr>
+            <a:lvl9pPr marL="2500000" indent="-228600" algn="l" defTabSz="914400" rtl="0" eaLnBrk="1" latinLnBrk="0" hangingPunct="1">
+              <a:lnSpc>
+                <a:spcPct val="90000"/>
+              </a:lnSpc>
+              <a:spcBef>
+                <a:spcPts val="300"/>
+              </a:spcBef>
+              <a:spcAft>
+                <a:spcPts val="300"/>
+              </a:spcAft>
+              <a:buClr>
+                <a:schemeClr val="accent1"/>
+              </a:buClr>
+              <a:buFont typeface="Wingdings 2" pitchFamily="18" charset="2"/>
+              <a:buChar char=""/>
+              <a:defRPr sz="1400" kern="1200">
+                <a:solidFill>
+                  <a:schemeClr val="tx1">
+                    <a:lumMod val="85000"/>
+                    <a:lumOff val="15000"/>
+                  </a:schemeClr>
+                </a:solidFill>
+                <a:latin typeface="+mn-lt"/>
+                <a:ea typeface="+mn-ea"/>
+                <a:cs typeface="+mn-cs"/>
+              </a:defRPr>
+            </a:lvl9pPr>
+          </a:lstStyle>
+          <a:p>
+            <a:pPr marL="0" indent="0">
+              <a:buNone/>
+            </a:pPr>
+            <a:r>
+              <a:rPr lang="en-US" b="1" dirty="0"/>
+              <a:t>Documentation</a:t>
+            </a:r>
+          </a:p>
+          <a:p>
+            <a:pPr lvl="1"/>
+            <a:r>
+              <a:rPr lang="en-US" dirty="0"/>
+              <a:t>Readme file (.md)</a:t>
+            </a:r>
+          </a:p>
+          <a:p>
+            <a:pPr lvl="2"/>
+            <a:r>
+              <a:rPr lang="en-US" dirty="0"/>
+              <a:t>This is usually created in GitHub repository and will be displayed on the main page of your repository.</a:t>
+            </a:r>
+          </a:p>
+          <a:p>
+            <a:pPr lvl="2"/>
+            <a:r>
+              <a:rPr lang="en-US" dirty="0"/>
+              <a:t>You can also create a readme in a .txt file</a:t>
+            </a:r>
+          </a:p>
+          <a:p>
+            <a:pPr lvl="1"/>
+            <a:r>
+              <a:rPr lang="en-US" dirty="0"/>
+              <a:t>Scripts</a:t>
+            </a:r>
+          </a:p>
+          <a:p>
+            <a:pPr lvl="2"/>
+            <a:r>
+              <a:rPr lang="en-US" dirty="0"/>
+              <a:t>Include a description at the top of each script detailing the goal of the script</a:t>
+            </a:r>
+          </a:p>
+          <a:p>
+            <a:pPr lvl="2"/>
+            <a:r>
+              <a:rPr lang="en-US" dirty="0"/>
+              <a:t>Include author name and contact info</a:t>
+            </a:r>
+          </a:p>
+          <a:p>
+            <a:pPr lvl="2"/>
+            <a:endParaRPr lang="en-US" dirty="0"/>
+          </a:p>
+          <a:p>
+            <a:pPr lvl="1"/>
+            <a:endParaRPr lang="en-US" dirty="0"/>
+          </a:p>
+        </p:txBody>
+      </p:sp>
+      <p:sp>
+        <p:nvSpPr>
+          <p:cNvPr id="6" name="TextBox 5">
+            <a:extLst>
+              <a:ext uri="{FF2B5EF4-FFF2-40B4-BE49-F238E27FC236}">
+                <a16:creationId xmlns:a16="http://schemas.microsoft.com/office/drawing/2014/main" id="{63013078-742F-8C69-7EEB-6CE6A14EEE3C}"/>
+              </a:ext>
+            </a:extLst>
+          </p:cNvPr>
+          <p:cNvSpPr txBox="1"/>
+          <p:nvPr/>
+        </p:nvSpPr>
+        <p:spPr>
+          <a:xfrm>
+            <a:off x="561646" y="5845909"/>
+            <a:ext cx="6105196" cy="646331"/>
+          </a:xfrm>
+          <a:prstGeom prst="rect">
+            <a:avLst/>
+          </a:prstGeom>
+          <a:noFill/>
+        </p:spPr>
+        <p:txBody>
+          <a:bodyPr wrap="square">
+            <a:spAutoFit/>
+          </a:bodyPr>
+          <a:lstStyle/>
+          <a:p>
+            <a:r>
+              <a:rPr lang="en-US" dirty="0">
+                <a:hlinkClick r:id="rId2"/>
+              </a:rPr>
+              <a:t>How to organize your analyses with R Studio Projects | R (for ecology)</a:t>
+            </a:r>
+            <a:endParaRPr lang="en-US" dirty="0"/>
+          </a:p>
+        </p:txBody>
+      </p:sp>
+      <p:pic>
+        <p:nvPicPr>
+          <p:cNvPr id="8" name="Picture 7">
+            <a:extLst>
+              <a:ext uri="{FF2B5EF4-FFF2-40B4-BE49-F238E27FC236}">
+                <a16:creationId xmlns:a16="http://schemas.microsoft.com/office/drawing/2014/main" id="{AEE92058-BE84-786F-64C2-F1D766227E32}"/>
+              </a:ext>
+            </a:extLst>
+          </p:cNvPr>
+          <p:cNvPicPr>
+            <a:picLocks noChangeAspect="1"/>
+          </p:cNvPicPr>
+          <p:nvPr/>
+        </p:nvPicPr>
+        <p:blipFill>
+          <a:blip r:embed="rId3"/>
+          <a:stretch>
+            <a:fillRect/>
+          </a:stretch>
+        </p:blipFill>
+        <p:spPr>
+          <a:xfrm>
+            <a:off x="7488787" y="2003534"/>
+            <a:ext cx="4376130" cy="3429000"/>
+          </a:xfrm>
+          <a:prstGeom prst="rect">
+            <a:avLst/>
+          </a:prstGeom>
+        </p:spPr>
+      </p:pic>
     </p:spTree>
     <p:extLst>
       <p:ext uri="{BB962C8B-B14F-4D97-AF65-F5344CB8AC3E}">
-        <p14:creationId xmlns:p14="http://schemas.microsoft.com/office/powerpoint/2010/main" val="741744540"/>
+        <p14:creationId xmlns:p14="http://schemas.microsoft.com/office/powerpoint/2010/main" val="3007478219"/>
       </p:ext>
     </p:extLst>
   </p:cSld>
@@ -5615,7 +7737,7 @@
           <p:cNvPr id="2" name="Title 1">
             <a:extLst>
               <a:ext uri="{FF2B5EF4-FFF2-40B4-BE49-F238E27FC236}">
-                <a16:creationId xmlns:a16="http://schemas.microsoft.com/office/drawing/2014/main" id="{E1890A8E-A790-FF76-0F5C-525C8FCA2541}"/>
+                <a16:creationId xmlns:a16="http://schemas.microsoft.com/office/drawing/2014/main" id="{FC9B95DC-31DA-9B84-EDCF-E0D44E74BDE7}"/>
               </a:ext>
             </a:extLst>
           </p:cNvPr>
@@ -5626,134 +7748,63 @@
             <p:ph type="title"/>
           </p:nvPr>
         </p:nvSpPr>
-        <p:spPr/>
+        <p:spPr>
+          <a:xfrm>
+            <a:off x="1261872" y="758952"/>
+            <a:ext cx="9418320" cy="1691640"/>
+          </a:xfrm>
+        </p:spPr>
         <p:txBody>
           <a:bodyPr/>
           <a:lstStyle/>
           <a:p>
             <a:r>
               <a:rPr lang="en-US" dirty="0"/>
-              <a:t>Branching and merging</a:t>
-            </a:r>
-          </a:p>
-        </p:txBody>
-      </p:sp>
-      <p:sp>
-        <p:nvSpPr>
-          <p:cNvPr id="3" name="Content Placeholder 2">
+              <a:t>Collaboration</a:t>
+            </a:r>
+          </a:p>
+        </p:txBody>
+      </p:sp>
+      <p:pic>
+        <p:nvPicPr>
+          <p:cNvPr id="7" name="Graphic 6" descr="Group success with solid fill">
             <a:extLst>
               <a:ext uri="{FF2B5EF4-FFF2-40B4-BE49-F238E27FC236}">
-                <a16:creationId xmlns:a16="http://schemas.microsoft.com/office/drawing/2014/main" id="{9AE378C3-878E-B9F1-DCF2-567C1E96E96E}"/>
+                <a16:creationId xmlns:a16="http://schemas.microsoft.com/office/drawing/2014/main" id="{948A5477-09BB-B9B0-EF96-3EDFA57F7201}"/>
               </a:ext>
             </a:extLst>
           </p:cNvPr>
-          <p:cNvSpPr>
-            <a:spLocks noGrp="1"/>
-          </p:cNvSpPr>
-          <p:nvPr>
-            <p:ph idx="1"/>
-          </p:nvPr>
-        </p:nvSpPr>
-        <p:spPr/>
-        <p:txBody>
-          <a:bodyPr/>
-          <a:lstStyle/>
-          <a:p>
-            <a:r>
-              <a:rPr lang="en-US" dirty="0"/>
-              <a:t>Work in the terminal</a:t>
-            </a:r>
-          </a:p>
-          <a:p>
-            <a:r>
-              <a:rPr lang="en-US" dirty="0"/>
-              <a:t>Create a branch</a:t>
-            </a:r>
-          </a:p>
-          <a:p>
-            <a:pPr lvl="1"/>
-            <a:r>
-              <a:rPr lang="en-US" dirty="0"/>
-              <a:t>git branch &lt;branch name&gt; OR</a:t>
-            </a:r>
-          </a:p>
-          <a:p>
-            <a:pPr lvl="1"/>
-            <a:r>
-              <a:rPr lang="en-US" dirty="0"/>
-              <a:t>git checkout –b “</a:t>
-            </a:r>
-            <a:r>
-              <a:rPr lang="en-US" i="1" dirty="0"/>
-              <a:t>new-branch-name</a:t>
-            </a:r>
-            <a:r>
-              <a:rPr lang="en-US" dirty="0"/>
-              <a:t>” OR</a:t>
-            </a:r>
-          </a:p>
-          <a:p>
-            <a:pPr lvl="1"/>
-            <a:r>
-              <a:rPr lang="en-US" dirty="0"/>
-              <a:t>Add a branch in the repository on GitHub, then pull changes</a:t>
-            </a:r>
-          </a:p>
-          <a:p>
-            <a:r>
-              <a:rPr lang="en-US" dirty="0"/>
-              <a:t>Merging branches</a:t>
-            </a:r>
-          </a:p>
-          <a:p>
-            <a:pPr lvl="1"/>
-            <a:r>
-              <a:rPr lang="en-US" dirty="0"/>
-              <a:t>git checkout main </a:t>
-            </a:r>
-            <a:r>
-              <a:rPr lang="en-US" dirty="0" err="1">
-                <a:solidFill>
-                  <a:srgbClr val="FF0000"/>
-                </a:solidFill>
-              </a:rPr>
-              <a:t>main</a:t>
-            </a:r>
-            <a:r>
-              <a:rPr lang="en-US" dirty="0">
-                <a:solidFill>
-                  <a:srgbClr val="FF0000"/>
-                </a:solidFill>
-              </a:rPr>
-              <a:t> is default branch, this directs you to the main branch</a:t>
-            </a:r>
-            <a:endParaRPr lang="en-US" dirty="0"/>
-          </a:p>
-          <a:p>
-            <a:pPr lvl="1"/>
-            <a:r>
-              <a:rPr lang="en-US" dirty="0"/>
-              <a:t>git merge </a:t>
-            </a:r>
-            <a:r>
-              <a:rPr lang="en-US" i="1" dirty="0"/>
-              <a:t>branch-name</a:t>
-            </a:r>
-            <a:r>
-              <a:rPr lang="en-US" dirty="0"/>
-              <a:t> </a:t>
-            </a:r>
-          </a:p>
-          <a:p>
-            <a:pPr lvl="1"/>
-            <a:endParaRPr lang="en-US" dirty="0"/>
-          </a:p>
-        </p:txBody>
-      </p:sp>
+          <p:cNvPicPr>
+            <a:picLocks noChangeAspect="1"/>
+          </p:cNvPicPr>
+          <p:nvPr/>
+        </p:nvPicPr>
+        <p:blipFill>
+          <a:blip r:embed="rId2">
+            <a:extLst>
+              <a:ext uri="{96DAC541-7B7A-43D3-8B79-37D633B846F1}">
+                <asvg:svgBlip xmlns:asvg="http://schemas.microsoft.com/office/drawing/2016/SVG/main" r:embed="rId3"/>
+              </a:ext>
+            </a:extLst>
+          </a:blip>
+          <a:stretch>
+            <a:fillRect/>
+          </a:stretch>
+        </p:blipFill>
+        <p:spPr>
+          <a:xfrm>
+            <a:off x="5971032" y="2290725"/>
+            <a:ext cx="2421750" cy="2421750"/>
+          </a:xfrm>
+          <a:prstGeom prst="rect">
+            <a:avLst/>
+          </a:prstGeom>
+        </p:spPr>
+      </p:pic>
     </p:spTree>
     <p:extLst>
       <p:ext uri="{BB962C8B-B14F-4D97-AF65-F5344CB8AC3E}">
-        <p14:creationId xmlns:p14="http://schemas.microsoft.com/office/powerpoint/2010/main" val="2134850308"/>
+        <p14:creationId xmlns:p14="http://schemas.microsoft.com/office/powerpoint/2010/main" val="1302369842"/>
       </p:ext>
     </p:extLst>
   </p:cSld>
@@ -5785,7 +7836,7 @@
           <p:cNvPr id="2" name="Title 1">
             <a:extLst>
               <a:ext uri="{FF2B5EF4-FFF2-40B4-BE49-F238E27FC236}">
-                <a16:creationId xmlns:a16="http://schemas.microsoft.com/office/drawing/2014/main" id="{531BA11A-1A8A-8C48-054C-996817B83D76}"/>
+                <a16:creationId xmlns:a16="http://schemas.microsoft.com/office/drawing/2014/main" id="{E7C4FA67-212C-CC7C-193B-345CC25710CC}"/>
               </a:ext>
             </a:extLst>
           </p:cNvPr>
@@ -5796,29 +7847,24 @@
             <p:ph type="title"/>
           </p:nvPr>
         </p:nvSpPr>
-        <p:spPr>
-          <a:xfrm>
-            <a:off x="1261872" y="758952"/>
-            <a:ext cx="9418320" cy="1857499"/>
-          </a:xfrm>
-        </p:spPr>
+        <p:spPr/>
         <p:txBody>
           <a:bodyPr/>
           <a:lstStyle/>
           <a:p>
             <a:r>
               <a:rPr lang="en-US" dirty="0"/>
-              <a:t>Other issues</a:t>
-            </a:r>
-          </a:p>
-        </p:txBody>
-      </p:sp>
-      <p:sp>
-        <p:nvSpPr>
-          <p:cNvPr id="3" name="Text Placeholder 2">
+              <a:t>Ways to collaborate</a:t>
+            </a:r>
+          </a:p>
+        </p:txBody>
+      </p:sp>
+      <p:sp>
+        <p:nvSpPr>
+          <p:cNvPr id="3" name="Content Placeholder 2">
             <a:extLst>
               <a:ext uri="{FF2B5EF4-FFF2-40B4-BE49-F238E27FC236}">
-                <a16:creationId xmlns:a16="http://schemas.microsoft.com/office/drawing/2014/main" id="{B6370AC5-2BBF-1542-7FAB-313691AFF0DC}"/>
+                <a16:creationId xmlns:a16="http://schemas.microsoft.com/office/drawing/2014/main" id="{91C7D7A3-E841-3368-7D75-F2B83A1BC6DF}"/>
               </a:ext>
             </a:extLst>
           </p:cNvPr>
@@ -5826,22 +7872,57 @@
             <a:spLocks noGrp="1"/>
           </p:cNvSpPr>
           <p:nvPr>
-            <p:ph type="body" idx="1"/>
-          </p:nvPr>
-        </p:nvSpPr>
-        <p:spPr/>
+            <p:ph idx="1"/>
+          </p:nvPr>
+        </p:nvSpPr>
+        <p:spPr>
+          <a:xfrm>
+            <a:off x="1261872" y="1828801"/>
+            <a:ext cx="8595360" cy="1792586"/>
+          </a:xfrm>
+        </p:spPr>
         <p:txBody>
           <a:bodyPr/>
           <a:lstStyle/>
           <a:p>
-            <a:endParaRPr lang="en-US"/>
+            <a:r>
+              <a:rPr lang="en-US" dirty="0"/>
+              <a:t>If multiple people are working on the same files, issues may arise. </a:t>
+            </a:r>
+          </a:p>
+          <a:p>
+            <a:r>
+              <a:rPr lang="en-US" dirty="0"/>
+              <a:t>A few ways to reduce issues:</a:t>
+            </a:r>
+          </a:p>
+          <a:p>
+            <a:pPr lvl="1"/>
+            <a:r>
+              <a:rPr lang="en-US" dirty="0"/>
+              <a:t>Stay in constant communication when multiple people are making edits to the same file</a:t>
+            </a:r>
+          </a:p>
+          <a:p>
+            <a:pPr lvl="1"/>
+            <a:r>
+              <a:rPr lang="en-US" dirty="0"/>
+              <a:t>Use branches to work on different versions of the file</a:t>
+            </a:r>
+          </a:p>
+          <a:p>
+            <a:pPr lvl="1"/>
+            <a:r>
+              <a:rPr lang="en-US" dirty="0"/>
+              <a:t>Use pull requests </a:t>
+            </a:r>
           </a:p>
         </p:txBody>
       </p:sp>
     </p:spTree>
     <p:extLst>
       <p:ext uri="{BB962C8B-B14F-4D97-AF65-F5344CB8AC3E}">
-        <p14:creationId xmlns:p14="http://schemas.microsoft.com/office/powerpoint/2010/main" val="797430869"/>
+        <p14:creationId xmlns:p14="http://schemas.microsoft.com/office/powerpoint/2010/main" val="741744540"/>
       </p:ext>
     </p:extLst>
   </p:cSld>
@@ -5873,7 +7954,7 @@
           <p:cNvPr id="2" name="Title 1">
             <a:extLst>
               <a:ext uri="{FF2B5EF4-FFF2-40B4-BE49-F238E27FC236}">
-                <a16:creationId xmlns:a16="http://schemas.microsoft.com/office/drawing/2014/main" id="{2ABAABEA-BD47-3A43-95D7-330DC5782799}"/>
+                <a16:creationId xmlns:a16="http://schemas.microsoft.com/office/drawing/2014/main" id="{E1890A8E-A790-FF76-0F5C-525C8FCA2541}"/>
               </a:ext>
             </a:extLst>
           </p:cNvPr>
@@ -5884,19 +7965,14 @@
             <p:ph type="title"/>
           </p:nvPr>
         </p:nvSpPr>
-        <p:spPr>
-          <a:xfrm>
-            <a:off x="713232" y="257118"/>
-            <a:ext cx="9692640" cy="1073741"/>
-          </a:xfrm>
-        </p:spPr>
+        <p:spPr/>
         <p:txBody>
           <a:bodyPr/>
           <a:lstStyle/>
           <a:p>
             <a:r>
               <a:rPr lang="en-US" dirty="0"/>
-              <a:t>When you have a lot of files to add:</a:t>
+              <a:t>Branching and merging</a:t>
             </a:r>
           </a:p>
         </p:txBody>
@@ -5906,7 +7982,7 @@
           <p:cNvPr id="3" name="Content Placeholder 2">
             <a:extLst>
               <a:ext uri="{FF2B5EF4-FFF2-40B4-BE49-F238E27FC236}">
-                <a16:creationId xmlns:a16="http://schemas.microsoft.com/office/drawing/2014/main" id="{90E94B3C-89C9-EE20-6B59-653C600EF1C3}"/>
+                <a16:creationId xmlns:a16="http://schemas.microsoft.com/office/drawing/2014/main" id="{9AE378C3-878E-B9F1-DCF2-567C1E96E96E}"/>
               </a:ext>
             </a:extLst>
           </p:cNvPr>
@@ -5919,51 +7995,68 @@
         </p:nvSpPr>
         <p:spPr/>
         <p:txBody>
-          <a:bodyPr>
-            <a:normAutofit/>
-          </a:bodyPr>
+          <a:bodyPr/>
           <a:lstStyle/>
           <a:p>
             <a:r>
               <a:rPr lang="en-US" dirty="0"/>
-              <a:t>Navigate to the “Terminal” tab of the console window:</a:t>
+              <a:t>Work in the terminal</a:t>
+            </a:r>
+          </a:p>
+          <a:p>
+            <a:r>
+              <a:rPr lang="en-US" dirty="0"/>
+              <a:t>Create a branch</a:t>
             </a:r>
           </a:p>
           <a:p>
             <a:pPr lvl="1"/>
             <a:r>
               <a:rPr lang="en-US" dirty="0"/>
-              <a:t>Check things are set up right</a:t>
-            </a:r>
-          </a:p>
-          <a:p>
-            <a:pPr lvl="2"/>
-            <a:r>
-              <a:rPr lang="en-US" dirty="0"/>
-              <a:t>git config --global user.name</a:t>
-            </a:r>
-          </a:p>
-          <a:p>
-            <a:pPr lvl="2"/>
-            <a:r>
-              <a:rPr lang="en-US" dirty="0"/>
-              <a:t>git config --global </a:t>
-            </a:r>
-            <a:r>
-              <a:rPr lang="en-US" dirty="0" err="1"/>
-              <a:t>user.email</a:t>
-            </a:r>
-            <a:endParaRPr lang="en-US" dirty="0"/>
-          </a:p>
-          <a:p>
-            <a:pPr lvl="2"/>
-            <a:r>
-              <a:rPr lang="en-US" dirty="0" err="1"/>
-              <a:t>pwd</a:t>
-            </a:r>
-            <a:r>
-              <a:rPr lang="en-US" dirty="0"/>
-              <a:t> </a:t>
+              <a:t>git branch &lt;branch name&gt; OR</a:t>
+            </a:r>
+          </a:p>
+          <a:p>
+            <a:pPr lvl="1"/>
+            <a:r>
+              <a:rPr lang="en-US" dirty="0"/>
+              <a:t>git checkout –b “</a:t>
+            </a:r>
+            <a:r>
+              <a:rPr lang="en-US" i="1" dirty="0"/>
+              <a:t>new-branch-name</a:t>
+            </a:r>
+            <a:r>
+              <a:rPr lang="en-US" dirty="0"/>
+              <a:t>” OR</a:t>
+            </a:r>
+          </a:p>
+          <a:p>
+            <a:pPr lvl="1"/>
+            <a:r>
+              <a:rPr lang="en-US" dirty="0"/>
+              <a:t>Add a branch in the repository on GitHub, then pull changes</a:t>
+            </a:r>
+          </a:p>
+          <a:p>
+            <a:r>
+              <a:rPr lang="en-US" dirty="0"/>
+              <a:t>Merging branches</a:t>
+            </a:r>
+          </a:p>
+          <a:p>
+            <a:pPr lvl="1"/>
+            <a:r>
+              <a:rPr lang="en-US" dirty="0"/>
+              <a:t>git checkout main </a:t>
+            </a:r>
+            <a:r>
+              <a:rPr lang="en-US" dirty="0" err="1">
+                <a:solidFill>
+                  <a:srgbClr val="FF0000"/>
+                </a:solidFill>
+              </a:rPr>
+              <a:t>main</a:t>
             </a:r>
             <a:r>
               <a:rPr lang="en-US" dirty="0">
@@ -5971,72 +8064,23 @@
                   <a:srgbClr val="FF0000"/>
                 </a:solidFill>
               </a:rPr>
-              <a:t>print working directory</a:t>
+              <a:t> is default branch, this directs you to the main branch</a:t>
             </a:r>
             <a:endParaRPr lang="en-US" dirty="0"/>
           </a:p>
           <a:p>
-            <a:r>
-              <a:rPr lang="en-US" dirty="0"/>
-              <a:t>Add all files to commit</a:t>
-            </a:r>
-          </a:p>
-          <a:p>
             <a:pPr lvl="1"/>
             <a:r>
               <a:rPr lang="en-US" dirty="0"/>
-              <a:t>git add –A</a:t>
-            </a:r>
-          </a:p>
-          <a:p>
-            <a:pPr lvl="1"/>
-            <a:r>
-              <a:rPr lang="en-US" dirty="0"/>
-              <a:t>git commit –m “write your commit message”</a:t>
-            </a:r>
-          </a:p>
-          <a:p>
-            <a:pPr lvl="1"/>
-            <a:r>
-              <a:rPr lang="en-US" dirty="0"/>
-              <a:t>git status </a:t>
-            </a:r>
-            <a:r>
-              <a:rPr lang="en-US" dirty="0">
-                <a:solidFill>
-                  <a:srgbClr val="FF0000"/>
-                </a:solidFill>
-              </a:rPr>
-              <a:t>check the files that have been added, untracked, etc.</a:t>
-            </a:r>
-          </a:p>
-          <a:p>
-            <a:pPr lvl="1"/>
-            <a:r>
-              <a:rPr lang="en-US" dirty="0"/>
-              <a:t>git remote –v </a:t>
-            </a:r>
-            <a:r>
-              <a:rPr lang="en-US" dirty="0">
-                <a:solidFill>
-                  <a:srgbClr val="FF0000"/>
-                </a:solidFill>
-              </a:rPr>
-              <a:t>check which repo you are pushing to. Should already be set up if you are already linked to a repo.</a:t>
-            </a:r>
-          </a:p>
-          <a:p>
-            <a:pPr lvl="1"/>
-            <a:r>
-              <a:rPr lang="en-US" dirty="0"/>
-              <a:t>git pull</a:t>
-            </a:r>
-          </a:p>
-          <a:p>
-            <a:pPr lvl="1"/>
-            <a:r>
-              <a:rPr lang="en-US" dirty="0"/>
-              <a:t>git push</a:t>
+              <a:t>git merge </a:t>
+            </a:r>
+            <a:r>
+              <a:rPr lang="en-US" i="1" dirty="0"/>
+              <a:t>branch-name</a:t>
+            </a:r>
+            <a:r>
+              <a:rPr lang="en-US" dirty="0"/>
+              <a:t> </a:t>
             </a:r>
           </a:p>
           <a:p>
@@ -6048,7 +8092,7 @@
     </p:spTree>
     <p:extLst>
       <p:ext uri="{BB962C8B-B14F-4D97-AF65-F5344CB8AC3E}">
-        <p14:creationId xmlns:p14="http://schemas.microsoft.com/office/powerpoint/2010/main" val="3251245353"/>
+        <p14:creationId xmlns:p14="http://schemas.microsoft.com/office/powerpoint/2010/main" val="2134850308"/>
       </p:ext>
     </p:extLst>
   </p:cSld>

</xml_diff>